<commit_message>
after correcting missing command for solr https setup
</commit_message>
<xml_diff>
--- a/Documentation/Guidlines_Sitecore9_Installation.pptx
+++ b/Documentation/Guidlines_Sitecore9_Installation.pptx
@@ -122,7 +122,7 @@
   </p:defaultTextStyle>
   <p:extLst>
     <p:ext uri="{EFAFB233-063F-42B5-8137-9DF3F51BA10A}">
-      <p15:sldGuideLst xmlns:p15="http://schemas.microsoft.com/office/powerpoint/2012/main"/>
+      <p15:sldGuideLst xmlns:p15="http://schemas.microsoft.com/office/powerpoint/2012/main" xmlns=""/>
     </p:ext>
   </p:extLst>
 </p:presentation>
@@ -169,7 +169,7 @@
             </a:duotone>
             <a:extLst>
               <a:ext uri="{28A0092B-C50C-407E-A947-70E740481C1C}">
-                <a14:useLocalDpi xmlns:a14="http://schemas.microsoft.com/office/drawing/2010/main" val="0"/>
+                <a14:useLocalDpi xmlns:a14="http://schemas.microsoft.com/office/drawing/2010/main" xmlns="" val="0"/>
               </a:ext>
             </a:extLst>
           </a:blip>
@@ -189,7 +189,7 @@
           <a:noFill/>
           <a:extLst>
             <a:ext uri="{909E8E84-426E-40dd-AFC4-6F175D3DCCD1}">
-              <a14:hiddenFill xmlns="" xmlns:a14="http://schemas.microsoft.com/office/drawing/2010/main">
+              <a14:hiddenFill xmlns:a14="http://schemas.microsoft.com/office/drawing/2010/main" xmlns="">
                 <a:solidFill>
                   <a:srgbClr val="FFFFFF"/>
                 </a:solidFill>
@@ -248,7 +248,7 @@
             </a:ln>
             <a:extLst>
               <a:ext uri="{91240B29-F687-4f45-9708-019B960494DF}">
-                <a14:hiddenLine xmlns="" xmlns:a14="http://schemas.microsoft.com/office/drawing/2010/main" w="9525">
+                <a14:hiddenLine xmlns:a14="http://schemas.microsoft.com/office/drawing/2010/main" xmlns="" w="9525">
                   <a:solidFill>
                     <a:srgbClr val="000000"/>
                   </a:solidFill>
@@ -338,7 +338,7 @@
             </a:ln>
             <a:extLst>
               <a:ext uri="{91240B29-F687-4f45-9708-019B960494DF}">
-                <a14:hiddenLine xmlns="" xmlns:a14="http://schemas.microsoft.com/office/drawing/2010/main" w="9525">
+                <a14:hiddenLine xmlns:a14="http://schemas.microsoft.com/office/drawing/2010/main" xmlns="" w="9525">
                   <a:solidFill>
                     <a:srgbClr val="000000"/>
                   </a:solidFill>
@@ -428,7 +428,7 @@
             </a:ln>
             <a:extLst>
               <a:ext uri="{91240B29-F687-4f45-9708-019B960494DF}">
-                <a14:hiddenLine xmlns="" xmlns:a14="http://schemas.microsoft.com/office/drawing/2010/main" w="9525">
+                <a14:hiddenLine xmlns:a14="http://schemas.microsoft.com/office/drawing/2010/main" xmlns="" w="9525">
                   <a:solidFill>
                     <a:srgbClr val="000000"/>
                   </a:solidFill>
@@ -462,7 +462,7 @@
             </a:ln>
             <a:extLst>
               <a:ext uri="{91240B29-F687-4f45-9708-019B960494DF}">
-                <a14:hiddenLine xmlns="" xmlns:a14="http://schemas.microsoft.com/office/drawing/2010/main" w="9525">
+                <a14:hiddenLine xmlns:a14="http://schemas.microsoft.com/office/drawing/2010/main" xmlns="" w="9525">
                   <a:solidFill>
                     <a:srgbClr val="000000"/>
                   </a:solidFill>
@@ -552,7 +552,7 @@
             </a:ln>
             <a:extLst>
               <a:ext uri="{91240B29-F687-4f45-9708-019B960494DF}">
-                <a14:hiddenLine xmlns="" xmlns:a14="http://schemas.microsoft.com/office/drawing/2010/main" w="9525">
+                <a14:hiddenLine xmlns:a14="http://schemas.microsoft.com/office/drawing/2010/main" xmlns="" w="9525">
                   <a:solidFill>
                     <a:srgbClr val="000000"/>
                   </a:solidFill>
@@ -614,7 +614,7 @@
             </a:ln>
             <a:extLst>
               <a:ext uri="{91240B29-F687-4f45-9708-019B960494DF}">
-                <a14:hiddenLine xmlns="" xmlns:a14="http://schemas.microsoft.com/office/drawing/2010/main" w="9525">
+                <a14:hiddenLine xmlns:a14="http://schemas.microsoft.com/office/drawing/2010/main" xmlns="" w="9525">
                   <a:solidFill>
                     <a:srgbClr val="000000"/>
                   </a:solidFill>
@@ -676,7 +676,7 @@
             </a:ln>
             <a:extLst>
               <a:ext uri="{91240B29-F687-4f45-9708-019B960494DF}">
-                <a14:hiddenLine xmlns="" xmlns:a14="http://schemas.microsoft.com/office/drawing/2010/main" w="9525">
+                <a14:hiddenLine xmlns:a14="http://schemas.microsoft.com/office/drawing/2010/main" xmlns="" w="9525">
                   <a:solidFill>
                     <a:srgbClr val="000000"/>
                   </a:solidFill>
@@ -766,7 +766,7 @@
             </a:ln>
             <a:extLst>
               <a:ext uri="{91240B29-F687-4f45-9708-019B960494DF}">
-                <a14:hiddenLine xmlns="" xmlns:a14="http://schemas.microsoft.com/office/drawing/2010/main" w="9525">
+                <a14:hiddenLine xmlns:a14="http://schemas.microsoft.com/office/drawing/2010/main" xmlns="" w="9525">
                   <a:solidFill>
                     <a:srgbClr val="000000"/>
                   </a:solidFill>
@@ -828,7 +828,7 @@
             </a:ln>
             <a:extLst>
               <a:ext uri="{91240B29-F687-4f45-9708-019B960494DF}">
-                <a14:hiddenLine xmlns="" xmlns:a14="http://schemas.microsoft.com/office/drawing/2010/main" w="9525">
+                <a14:hiddenLine xmlns:a14="http://schemas.microsoft.com/office/drawing/2010/main" xmlns="" w="9525">
                   <a:solidFill>
                     <a:srgbClr val="000000"/>
                   </a:solidFill>
@@ -890,7 +890,7 @@
             </a:ln>
             <a:extLst>
               <a:ext uri="{91240B29-F687-4f45-9708-019B960494DF}">
-                <a14:hiddenLine xmlns="" xmlns:a14="http://schemas.microsoft.com/office/drawing/2010/main" w="9525">
+                <a14:hiddenLine xmlns:a14="http://schemas.microsoft.com/office/drawing/2010/main" xmlns="" w="9525">
                   <a:solidFill>
                     <a:srgbClr val="000000"/>
                   </a:solidFill>
@@ -980,7 +980,7 @@
             </a:ln>
             <a:extLst>
               <a:ext uri="{91240B29-F687-4f45-9708-019B960494DF}">
-                <a14:hiddenLine xmlns="" xmlns:a14="http://schemas.microsoft.com/office/drawing/2010/main" w="9525">
+                <a14:hiddenLine xmlns:a14="http://schemas.microsoft.com/office/drawing/2010/main" xmlns="" w="9525">
                   <a:solidFill>
                     <a:srgbClr val="000000"/>
                   </a:solidFill>
@@ -1070,7 +1070,7 @@
             </a:ln>
             <a:extLst>
               <a:ext uri="{91240B29-F687-4f45-9708-019B960494DF}">
-                <a14:hiddenLine xmlns="" xmlns:a14="http://schemas.microsoft.com/office/drawing/2010/main" w="9525">
+                <a14:hiddenLine xmlns:a14="http://schemas.microsoft.com/office/drawing/2010/main" xmlns="" w="9525">
                   <a:solidFill>
                     <a:srgbClr val="000000"/>
                   </a:solidFill>
@@ -1132,7 +1132,7 @@
             </a:ln>
             <a:extLst>
               <a:ext uri="{91240B29-F687-4f45-9708-019B960494DF}">
-                <a14:hiddenLine xmlns="" xmlns:a14="http://schemas.microsoft.com/office/drawing/2010/main" w="9525">
+                <a14:hiddenLine xmlns:a14="http://schemas.microsoft.com/office/drawing/2010/main" xmlns="" w="9525">
                   <a:solidFill>
                     <a:srgbClr val="000000"/>
                   </a:solidFill>
@@ -1242,7 +1242,7 @@
             </a:ln>
             <a:extLst>
               <a:ext uri="{91240B29-F687-4f45-9708-019B960494DF}">
-                <a14:hiddenLine xmlns="" xmlns:a14="http://schemas.microsoft.com/office/drawing/2010/main" w="9525">
+                <a14:hiddenLine xmlns:a14="http://schemas.microsoft.com/office/drawing/2010/main" xmlns="" w="9525">
                   <a:solidFill>
                     <a:srgbClr val="000000"/>
                   </a:solidFill>
@@ -1304,7 +1304,7 @@
             </a:ln>
             <a:extLst>
               <a:ext uri="{91240B29-F687-4f45-9708-019B960494DF}">
-                <a14:hiddenLine xmlns="" xmlns:a14="http://schemas.microsoft.com/office/drawing/2010/main" w="9525">
+                <a14:hiddenLine xmlns:a14="http://schemas.microsoft.com/office/drawing/2010/main" xmlns="" w="9525">
                   <a:solidFill>
                     <a:srgbClr val="000000"/>
                   </a:solidFill>
@@ -1394,7 +1394,7 @@
             </a:ln>
             <a:extLst>
               <a:ext uri="{91240B29-F687-4f45-9708-019B960494DF}">
-                <a14:hiddenLine xmlns="" xmlns:a14="http://schemas.microsoft.com/office/drawing/2010/main" w="9525">
+                <a14:hiddenLine xmlns:a14="http://schemas.microsoft.com/office/drawing/2010/main" xmlns="" w="9525">
                   <a:solidFill>
                     <a:srgbClr val="000000"/>
                   </a:solidFill>
@@ -1484,7 +1484,7 @@
             </a:ln>
             <a:extLst>
               <a:ext uri="{91240B29-F687-4f45-9708-019B960494DF}">
-                <a14:hiddenLine xmlns="" xmlns:a14="http://schemas.microsoft.com/office/drawing/2010/main" w="9525">
+                <a14:hiddenLine xmlns:a14="http://schemas.microsoft.com/office/drawing/2010/main" xmlns="" w="9525">
                   <a:solidFill>
                     <a:srgbClr val="000000"/>
                   </a:solidFill>
@@ -1546,7 +1546,7 @@
             </a:ln>
             <a:extLst>
               <a:ext uri="{91240B29-F687-4f45-9708-019B960494DF}">
-                <a14:hiddenLine xmlns="" xmlns:a14="http://schemas.microsoft.com/office/drawing/2010/main" w="9525">
+                <a14:hiddenLine xmlns:a14="http://schemas.microsoft.com/office/drawing/2010/main" xmlns="" w="9525">
                   <a:solidFill>
                     <a:srgbClr val="000000"/>
                   </a:solidFill>
@@ -1636,7 +1636,7 @@
             </a:ln>
             <a:extLst>
               <a:ext uri="{91240B29-F687-4f45-9708-019B960494DF}">
-                <a14:hiddenLine xmlns="" xmlns:a14="http://schemas.microsoft.com/office/drawing/2010/main" w="9525">
+                <a14:hiddenLine xmlns:a14="http://schemas.microsoft.com/office/drawing/2010/main" xmlns="" w="9525">
                   <a:solidFill>
                     <a:srgbClr val="000000"/>
                   </a:solidFill>
@@ -1726,7 +1726,7 @@
             </a:ln>
             <a:extLst>
               <a:ext uri="{91240B29-F687-4f45-9708-019B960494DF}">
-                <a14:hiddenLine xmlns="" xmlns:a14="http://schemas.microsoft.com/office/drawing/2010/main" w="9525">
+                <a14:hiddenLine xmlns:a14="http://schemas.microsoft.com/office/drawing/2010/main" xmlns="" w="9525">
                   <a:solidFill>
                     <a:srgbClr val="000000"/>
                   </a:solidFill>
@@ -1782,7 +1782,7 @@
             </a:ln>
             <a:extLst>
               <a:ext uri="{91240B29-F687-4f45-9708-019B960494DF}">
-                <a14:hiddenLine xmlns="" xmlns:a14="http://schemas.microsoft.com/office/drawing/2010/main" w="9525">
+                <a14:hiddenLine xmlns:a14="http://schemas.microsoft.com/office/drawing/2010/main" xmlns="" w="9525">
                   <a:solidFill>
                     <a:srgbClr val="000000"/>
                   </a:solidFill>
@@ -1872,7 +1872,7 @@
             </a:ln>
             <a:extLst>
               <a:ext uri="{91240B29-F687-4f45-9708-019B960494DF}">
-                <a14:hiddenLine xmlns="" xmlns:a14="http://schemas.microsoft.com/office/drawing/2010/main" w="9525">
+                <a14:hiddenLine xmlns:a14="http://schemas.microsoft.com/office/drawing/2010/main" xmlns="" w="9525">
                   <a:solidFill>
                     <a:srgbClr val="000000"/>
                   </a:solidFill>
@@ -1928,7 +1928,7 @@
             </a:ln>
             <a:extLst>
               <a:ext uri="{91240B29-F687-4f45-9708-019B960494DF}">
-                <a14:hiddenLine xmlns="" xmlns:a14="http://schemas.microsoft.com/office/drawing/2010/main" w="9525">
+                <a14:hiddenLine xmlns:a14="http://schemas.microsoft.com/office/drawing/2010/main" xmlns="" w="9525">
                   <a:solidFill>
                     <a:srgbClr val="000000"/>
                   </a:solidFill>
@@ -2018,7 +2018,7 @@
             </a:ln>
             <a:extLst>
               <a:ext uri="{91240B29-F687-4f45-9708-019B960494DF}">
-                <a14:hiddenLine xmlns="" xmlns:a14="http://schemas.microsoft.com/office/drawing/2010/main" w="9525">
+                <a14:hiddenLine xmlns:a14="http://schemas.microsoft.com/office/drawing/2010/main" xmlns="" w="9525">
                   <a:solidFill>
                     <a:srgbClr val="000000"/>
                   </a:solidFill>
@@ -2086,7 +2086,7 @@
             </a:ln>
             <a:extLst>
               <a:ext uri="{91240B29-F687-4f45-9708-019B960494DF}">
-                <a14:hiddenLine xmlns="" xmlns:a14="http://schemas.microsoft.com/office/drawing/2010/main" w="9525">
+                <a14:hiddenLine xmlns:a14="http://schemas.microsoft.com/office/drawing/2010/main" xmlns="" w="9525">
                   <a:solidFill>
                     <a:srgbClr val="000000"/>
                   </a:solidFill>
@@ -2176,7 +2176,7 @@
             </a:ln>
             <a:extLst>
               <a:ext uri="{91240B29-F687-4f45-9708-019B960494DF}">
-                <a14:hiddenLine xmlns="" xmlns:a14="http://schemas.microsoft.com/office/drawing/2010/main" w="9525">
+                <a14:hiddenLine xmlns:a14="http://schemas.microsoft.com/office/drawing/2010/main" xmlns="" w="9525">
                   <a:solidFill>
                     <a:srgbClr val="000000"/>
                   </a:solidFill>
@@ -2244,7 +2244,7 @@
             </a:ln>
             <a:extLst>
               <a:ext uri="{91240B29-F687-4f45-9708-019B960494DF}">
-                <a14:hiddenLine xmlns="" xmlns:a14="http://schemas.microsoft.com/office/drawing/2010/main" w="9525">
+                <a14:hiddenLine xmlns:a14="http://schemas.microsoft.com/office/drawing/2010/main" xmlns="" w="9525">
                   <a:solidFill>
                     <a:srgbClr val="000000"/>
                   </a:solidFill>
@@ -2334,7 +2334,7 @@
             </a:ln>
             <a:extLst>
               <a:ext uri="{91240B29-F687-4f45-9708-019B960494DF}">
-                <a14:hiddenLine xmlns="" xmlns:a14="http://schemas.microsoft.com/office/drawing/2010/main" w="9525">
+                <a14:hiddenLine xmlns:a14="http://schemas.microsoft.com/office/drawing/2010/main" xmlns="" w="9525">
                   <a:solidFill>
                     <a:srgbClr val="000000"/>
                   </a:solidFill>
@@ -2368,7 +2368,7 @@
             </a:ln>
             <a:extLst>
               <a:ext uri="{91240B29-F687-4f45-9708-019B960494DF}">
-                <a14:hiddenLine xmlns="" xmlns:a14="http://schemas.microsoft.com/office/drawing/2010/main" w="9525">
+                <a14:hiddenLine xmlns:a14="http://schemas.microsoft.com/office/drawing/2010/main" xmlns="" w="9525">
                   <a:solidFill>
                     <a:srgbClr val="000000"/>
                   </a:solidFill>
@@ -2458,7 +2458,7 @@
             </a:ln>
             <a:extLst>
               <a:ext uri="{91240B29-F687-4f45-9708-019B960494DF}">
-                <a14:hiddenLine xmlns="" xmlns:a14="http://schemas.microsoft.com/office/drawing/2010/main" w="9525">
+                <a14:hiddenLine xmlns:a14="http://schemas.microsoft.com/office/drawing/2010/main" xmlns="" w="9525">
                   <a:solidFill>
                     <a:srgbClr val="000000"/>
                   </a:solidFill>
@@ -2520,7 +2520,7 @@
             </a:ln>
             <a:extLst>
               <a:ext uri="{91240B29-F687-4f45-9708-019B960494DF}">
-                <a14:hiddenLine xmlns="" xmlns:a14="http://schemas.microsoft.com/office/drawing/2010/main" w="9525">
+                <a14:hiddenLine xmlns:a14="http://schemas.microsoft.com/office/drawing/2010/main" xmlns="" w="9525">
                   <a:solidFill>
                     <a:srgbClr val="000000"/>
                   </a:solidFill>
@@ -2582,7 +2582,7 @@
             </a:ln>
             <a:extLst>
               <a:ext uri="{91240B29-F687-4f45-9708-019B960494DF}">
-                <a14:hiddenLine xmlns="" xmlns:a14="http://schemas.microsoft.com/office/drawing/2010/main" w="9525">
+                <a14:hiddenLine xmlns:a14="http://schemas.microsoft.com/office/drawing/2010/main" xmlns="" w="9525">
                   <a:solidFill>
                     <a:srgbClr val="000000"/>
                   </a:solidFill>
@@ -2672,7 +2672,7 @@
             </a:ln>
             <a:extLst>
               <a:ext uri="{91240B29-F687-4f45-9708-019B960494DF}">
-                <a14:hiddenLine xmlns="" xmlns:a14="http://schemas.microsoft.com/office/drawing/2010/main" w="9525">
+                <a14:hiddenLine xmlns:a14="http://schemas.microsoft.com/office/drawing/2010/main" xmlns="" w="9525">
                   <a:solidFill>
                     <a:srgbClr val="000000"/>
                   </a:solidFill>
@@ -2740,7 +2740,7 @@
             </a:ln>
             <a:extLst>
               <a:ext uri="{91240B29-F687-4f45-9708-019B960494DF}">
-                <a14:hiddenLine xmlns="" xmlns:a14="http://schemas.microsoft.com/office/drawing/2010/main" w="9525">
+                <a14:hiddenLine xmlns:a14="http://schemas.microsoft.com/office/drawing/2010/main" xmlns="" w="9525">
                   <a:solidFill>
                     <a:srgbClr val="000000"/>
                   </a:solidFill>
@@ -2802,7 +2802,7 @@
             </a:ln>
             <a:extLst>
               <a:ext uri="{91240B29-F687-4f45-9708-019B960494DF}">
-                <a14:hiddenLine xmlns="" xmlns:a14="http://schemas.microsoft.com/office/drawing/2010/main" w="9525">
+                <a14:hiddenLine xmlns:a14="http://schemas.microsoft.com/office/drawing/2010/main" xmlns="" w="9525">
                   <a:solidFill>
                     <a:srgbClr val="000000"/>
                   </a:solidFill>
@@ -2892,7 +2892,7 @@
             </a:ln>
             <a:extLst>
               <a:ext uri="{91240B29-F687-4f45-9708-019B960494DF}">
-                <a14:hiddenLine xmlns="" xmlns:a14="http://schemas.microsoft.com/office/drawing/2010/main" w="9525">
+                <a14:hiddenLine xmlns:a14="http://schemas.microsoft.com/office/drawing/2010/main" xmlns="" w="9525">
                   <a:solidFill>
                     <a:srgbClr val="000000"/>
                   </a:solidFill>
@@ -2954,7 +2954,7 @@
             </a:ln>
             <a:extLst>
               <a:ext uri="{91240B29-F687-4f45-9708-019B960494DF}">
-                <a14:hiddenLine xmlns="" xmlns:a14="http://schemas.microsoft.com/office/drawing/2010/main" w="9525">
+                <a14:hiddenLine xmlns:a14="http://schemas.microsoft.com/office/drawing/2010/main" xmlns="" w="9525">
                   <a:solidFill>
                     <a:srgbClr val="000000"/>
                   </a:solidFill>
@@ -3044,7 +3044,7 @@
             </a:ln>
             <a:extLst>
               <a:ext uri="{91240B29-F687-4f45-9708-019B960494DF}">
-                <a14:hiddenLine xmlns="" xmlns:a14="http://schemas.microsoft.com/office/drawing/2010/main" w="9525">
+                <a14:hiddenLine xmlns:a14="http://schemas.microsoft.com/office/drawing/2010/main" xmlns="" w="9525">
                   <a:solidFill>
                     <a:srgbClr val="000000"/>
                   </a:solidFill>
@@ -3106,7 +3106,7 @@
             </a:ln>
             <a:extLst>
               <a:ext uri="{91240B29-F687-4f45-9708-019B960494DF}">
-                <a14:hiddenLine xmlns="" xmlns:a14="http://schemas.microsoft.com/office/drawing/2010/main" w="9525">
+                <a14:hiddenLine xmlns:a14="http://schemas.microsoft.com/office/drawing/2010/main" xmlns="" w="9525">
                   <a:solidFill>
                     <a:srgbClr val="000000"/>
                   </a:solidFill>
@@ -3196,7 +3196,7 @@
             </a:ln>
             <a:extLst>
               <a:ext uri="{91240B29-F687-4f45-9708-019B960494DF}">
-                <a14:hiddenLine xmlns="" xmlns:a14="http://schemas.microsoft.com/office/drawing/2010/main" w="9525">
+                <a14:hiddenLine xmlns:a14="http://schemas.microsoft.com/office/drawing/2010/main" xmlns="" w="9525">
                   <a:solidFill>
                     <a:srgbClr val="000000"/>
                   </a:solidFill>
@@ -3230,7 +3230,7 @@
             </a:ln>
             <a:extLst>
               <a:ext uri="{91240B29-F687-4f45-9708-019B960494DF}">
-                <a14:hiddenLine xmlns="" xmlns:a14="http://schemas.microsoft.com/office/drawing/2010/main" w="9525">
+                <a14:hiddenLine xmlns:a14="http://schemas.microsoft.com/office/drawing/2010/main" xmlns="" w="9525">
                   <a:solidFill>
                     <a:srgbClr val="000000"/>
                   </a:solidFill>
@@ -3295,7 +3295,7 @@
             </a:ln>
             <a:extLst>
               <a:ext uri="{91240B29-F687-4f45-9708-019B960494DF}">
-                <a14:hiddenLine xmlns="" xmlns:a14="http://schemas.microsoft.com/office/drawing/2010/main" w="9525">
+                <a14:hiddenLine xmlns:a14="http://schemas.microsoft.com/office/drawing/2010/main" xmlns="" w="9525">
                   <a:solidFill>
                     <a:srgbClr val="000000"/>
                   </a:solidFill>
@@ -3385,7 +3385,7 @@
             </a:ln>
             <a:extLst>
               <a:ext uri="{91240B29-F687-4f45-9708-019B960494DF}">
-                <a14:hiddenLine xmlns="" xmlns:a14="http://schemas.microsoft.com/office/drawing/2010/main" w="9525">
+                <a14:hiddenLine xmlns:a14="http://schemas.microsoft.com/office/drawing/2010/main" xmlns="" w="9525">
                   <a:solidFill>
                     <a:srgbClr val="000000"/>
                   </a:solidFill>
@@ -3447,7 +3447,7 @@
             </a:ln>
             <a:extLst>
               <a:ext uri="{91240B29-F687-4f45-9708-019B960494DF}">
-                <a14:hiddenLine xmlns="" xmlns:a14="http://schemas.microsoft.com/office/drawing/2010/main" w="9525">
+                <a14:hiddenLine xmlns:a14="http://schemas.microsoft.com/office/drawing/2010/main" xmlns="" w="9525">
                   <a:solidFill>
                     <a:srgbClr val="000000"/>
                   </a:solidFill>
@@ -3537,7 +3537,7 @@
             </a:ln>
             <a:extLst>
               <a:ext uri="{91240B29-F687-4f45-9708-019B960494DF}">
-                <a14:hiddenLine xmlns="" xmlns:a14="http://schemas.microsoft.com/office/drawing/2010/main" w="9525">
+                <a14:hiddenLine xmlns:a14="http://schemas.microsoft.com/office/drawing/2010/main" xmlns="" w="9525">
                   <a:solidFill>
                     <a:srgbClr val="000000"/>
                   </a:solidFill>
@@ -3627,7 +3627,7 @@
             </a:ln>
             <a:extLst>
               <a:ext uri="{91240B29-F687-4f45-9708-019B960494DF}">
-                <a14:hiddenLine xmlns="" xmlns:a14="http://schemas.microsoft.com/office/drawing/2010/main" w="9525">
+                <a14:hiddenLine xmlns:a14="http://schemas.microsoft.com/office/drawing/2010/main" xmlns="" w="9525">
                   <a:solidFill>
                     <a:srgbClr val="000000"/>
                   </a:solidFill>
@@ -3692,7 +3692,7 @@
             </a:ln>
             <a:extLst>
               <a:ext uri="{91240B29-F687-4f45-9708-019B960494DF}">
-                <a14:hiddenLine xmlns="" xmlns:a14="http://schemas.microsoft.com/office/drawing/2010/main" w="9525">
+                <a14:hiddenLine xmlns:a14="http://schemas.microsoft.com/office/drawing/2010/main" xmlns="" w="9525">
                   <a:solidFill>
                     <a:srgbClr val="000000"/>
                   </a:solidFill>
@@ -3754,7 +3754,7 @@
             </a:ln>
             <a:extLst>
               <a:ext uri="{91240B29-F687-4f45-9708-019B960494DF}">
-                <a14:hiddenLine xmlns="" xmlns:a14="http://schemas.microsoft.com/office/drawing/2010/main" w="9525">
+                <a14:hiddenLine xmlns:a14="http://schemas.microsoft.com/office/drawing/2010/main" xmlns="" w="9525">
                   <a:solidFill>
                     <a:srgbClr val="000000"/>
                   </a:solidFill>
@@ -3844,7 +3844,7 @@
             </a:ln>
             <a:extLst>
               <a:ext uri="{91240B29-F687-4f45-9708-019B960494DF}">
-                <a14:hiddenLine xmlns="" xmlns:a14="http://schemas.microsoft.com/office/drawing/2010/main" w="9525">
+                <a14:hiddenLine xmlns:a14="http://schemas.microsoft.com/office/drawing/2010/main" xmlns="" w="9525">
                   <a:solidFill>
                     <a:srgbClr val="000000"/>
                   </a:solidFill>
@@ -3934,7 +3934,7 @@
             </a:ln>
             <a:extLst>
               <a:ext uri="{91240B29-F687-4f45-9708-019B960494DF}">
-                <a14:hiddenLine xmlns="" xmlns:a14="http://schemas.microsoft.com/office/drawing/2010/main" w="9525">
+                <a14:hiddenLine xmlns:a14="http://schemas.microsoft.com/office/drawing/2010/main" xmlns="" w="9525">
                   <a:solidFill>
                     <a:srgbClr val="000000"/>
                   </a:solidFill>
@@ -3996,7 +3996,7 @@
             </a:ln>
             <a:extLst>
               <a:ext uri="{91240B29-F687-4f45-9708-019B960494DF}">
-                <a14:hiddenLine xmlns="" xmlns:a14="http://schemas.microsoft.com/office/drawing/2010/main" w="9525">
+                <a14:hiddenLine xmlns:a14="http://schemas.microsoft.com/office/drawing/2010/main" xmlns="" w="9525">
                   <a:solidFill>
                     <a:srgbClr val="000000"/>
                   </a:solidFill>
@@ -4116,7 +4116,7 @@
             </a:ln>
             <a:extLst>
               <a:ext uri="{91240B29-F687-4f45-9708-019B960494DF}">
-                <a14:hiddenLine xmlns="" xmlns:a14="http://schemas.microsoft.com/office/drawing/2010/main" w="9525">
+                <a14:hiddenLine xmlns:a14="http://schemas.microsoft.com/office/drawing/2010/main" xmlns="" w="9525">
                   <a:solidFill>
                     <a:srgbClr val="000000"/>
                   </a:solidFill>
@@ -4184,7 +4184,7 @@
             </a:ln>
             <a:extLst>
               <a:ext uri="{91240B29-F687-4f45-9708-019B960494DF}">
-                <a14:hiddenLine xmlns="" xmlns:a14="http://schemas.microsoft.com/office/drawing/2010/main" w="9525">
+                <a14:hiddenLine xmlns:a14="http://schemas.microsoft.com/office/drawing/2010/main" xmlns="" w="9525">
                   <a:solidFill>
                     <a:srgbClr val="000000"/>
                   </a:solidFill>
@@ -4274,7 +4274,7 @@
             </a:ln>
             <a:extLst>
               <a:ext uri="{91240B29-F687-4f45-9708-019B960494DF}">
-                <a14:hiddenLine xmlns="" xmlns:a14="http://schemas.microsoft.com/office/drawing/2010/main" w="9525">
+                <a14:hiddenLine xmlns:a14="http://schemas.microsoft.com/office/drawing/2010/main" xmlns="" w="9525">
                   <a:solidFill>
                     <a:srgbClr val="000000"/>
                   </a:solidFill>
@@ -4414,7 +4414,8 @@
           <a:p>
             <a:fld id="{48A87A34-81AB-432B-8DAE-1953F412C126}" type="datetimeFigureOut">
               <a:rPr lang="en-US" dirty="0"/>
-              <a:t>12/12/2017</a:t>
+              <a:pPr/>
+              <a:t>10/16/2020</a:t>
             </a:fld>
             <a:endParaRPr lang="en-US" dirty="0"/>
           </a:p>
@@ -4466,6 +4467,7 @@
           <a:p>
             <a:fld id="{6D22F896-40B5-4ADD-8801-0D06FADFA095}" type="slidenum">
               <a:rPr lang="en-US" dirty="0"/>
+              <a:pPr/>
               <a:t>‹#›</a:t>
             </a:fld>
             <a:endParaRPr lang="en-US" dirty="0"/>
@@ -4676,7 +4678,8 @@
           <a:p>
             <a:fld id="{48A87A34-81AB-432B-8DAE-1953F412C126}" type="datetimeFigureOut">
               <a:rPr lang="en-US" dirty="0"/>
-              <a:t>12/12/2017</a:t>
+              <a:pPr/>
+              <a:t>10/16/2020</a:t>
             </a:fld>
             <a:endParaRPr lang="en-US" dirty="0"/>
           </a:p>
@@ -4718,6 +4721,7 @@
           <a:p>
             <a:fld id="{6D22F896-40B5-4ADD-8801-0D06FADFA095}" type="slidenum">
               <a:rPr lang="en-US" dirty="0"/>
+              <a:pPr/>
               <a:t>‹#›</a:t>
             </a:fld>
             <a:endParaRPr lang="en-US" dirty="0"/>
@@ -4867,7 +4871,8 @@
           <a:p>
             <a:fld id="{48A87A34-81AB-432B-8DAE-1953F412C126}" type="datetimeFigureOut">
               <a:rPr lang="en-US" dirty="0"/>
-              <a:t>12/12/2017</a:t>
+              <a:pPr/>
+              <a:t>10/16/2020</a:t>
             </a:fld>
             <a:endParaRPr lang="en-US" dirty="0"/>
           </a:p>
@@ -4909,6 +4914,7 @@
           <a:p>
             <a:fld id="{6D22F896-40B5-4ADD-8801-0D06FADFA095}" type="slidenum">
               <a:rPr lang="en-US" dirty="0"/>
+              <a:pPr/>
               <a:t>‹#›</a:t>
             </a:fld>
             <a:endParaRPr lang="en-US" dirty="0"/>
@@ -5125,7 +5131,8 @@
           <a:p>
             <a:fld id="{48A87A34-81AB-432B-8DAE-1953F412C126}" type="datetimeFigureOut">
               <a:rPr lang="en-US" dirty="0"/>
-              <a:t>12/12/2017</a:t>
+              <a:pPr/>
+              <a:t>10/16/2020</a:t>
             </a:fld>
             <a:endParaRPr lang="en-US" dirty="0"/>
           </a:p>
@@ -5167,6 +5174,7 @@
           <a:p>
             <a:fld id="{6D22F896-40B5-4ADD-8801-0D06FADFA095}" type="slidenum">
               <a:rPr lang="en-US" dirty="0"/>
+              <a:pPr/>
               <a:t>‹#›</a:t>
             </a:fld>
             <a:endParaRPr lang="en-US" dirty="0"/>
@@ -5554,7 +5562,8 @@
           <a:p>
             <a:fld id="{48A87A34-81AB-432B-8DAE-1953F412C126}" type="datetimeFigureOut">
               <a:rPr lang="en-US" dirty="0"/>
-              <a:t>12/12/2017</a:t>
+              <a:pPr/>
+              <a:t>10/16/2020</a:t>
             </a:fld>
             <a:endParaRPr lang="en-US" dirty="0"/>
           </a:p>
@@ -5596,6 +5605,7 @@
           <a:p>
             <a:fld id="{6D22F896-40B5-4ADD-8801-0D06FADFA095}" type="slidenum">
               <a:rPr lang="en-US" dirty="0"/>
+              <a:pPr/>
               <a:t>‹#›</a:t>
             </a:fld>
             <a:endParaRPr lang="en-US" dirty="0"/>
@@ -6095,7 +6105,8 @@
           <a:p>
             <a:fld id="{48A87A34-81AB-432B-8DAE-1953F412C126}" type="datetimeFigureOut">
               <a:rPr lang="en-US" dirty="0"/>
-              <a:t>12/12/2017</a:t>
+              <a:pPr/>
+              <a:t>10/16/2020</a:t>
             </a:fld>
             <a:endParaRPr lang="en-US" dirty="0"/>
           </a:p>
@@ -6137,6 +6148,7 @@
           <a:p>
             <a:fld id="{6D22F896-40B5-4ADD-8801-0D06FADFA095}" type="slidenum">
               <a:rPr lang="en-US" dirty="0"/>
+              <a:pPr/>
               <a:t>‹#›</a:t>
             </a:fld>
             <a:endParaRPr lang="en-US" dirty="0"/>
@@ -6810,7 +6822,8 @@
           <a:p>
             <a:fld id="{48A87A34-81AB-432B-8DAE-1953F412C126}" type="datetimeFigureOut">
               <a:rPr lang="en-US" dirty="0"/>
-              <a:t>12/12/2017</a:t>
+              <a:pPr/>
+              <a:t>10/16/2020</a:t>
             </a:fld>
             <a:endParaRPr lang="en-US" dirty="0"/>
           </a:p>
@@ -6852,6 +6865,7 @@
           <a:p>
             <a:fld id="{6D22F896-40B5-4ADD-8801-0D06FADFA095}" type="slidenum">
               <a:rPr lang="en-US" dirty="0"/>
+              <a:pPr/>
               <a:t>‹#›</a:t>
             </a:fld>
             <a:endParaRPr lang="en-US" dirty="0"/>
@@ -6975,7 +6989,8 @@
           <a:p>
             <a:fld id="{48A87A34-81AB-432B-8DAE-1953F412C126}" type="datetimeFigureOut">
               <a:rPr lang="en-US" dirty="0"/>
-              <a:t>12/12/2017</a:t>
+              <a:pPr/>
+              <a:t>10/16/2020</a:t>
             </a:fld>
             <a:endParaRPr lang="en-US" dirty="0"/>
           </a:p>
@@ -7017,6 +7032,7 @@
           <a:p>
             <a:fld id="{6D22F896-40B5-4ADD-8801-0D06FADFA095}" type="slidenum">
               <a:rPr lang="en-US" dirty="0"/>
+              <a:pPr/>
               <a:t>‹#›</a:t>
             </a:fld>
             <a:endParaRPr lang="en-US" dirty="0"/>
@@ -7150,7 +7166,8 @@
           <a:p>
             <a:fld id="{48A87A34-81AB-432B-8DAE-1953F412C126}" type="datetimeFigureOut">
               <a:rPr lang="en-US" dirty="0"/>
-              <a:t>12/12/2017</a:t>
+              <a:pPr/>
+              <a:t>10/16/2020</a:t>
             </a:fld>
             <a:endParaRPr lang="en-US" dirty="0"/>
           </a:p>
@@ -7192,6 +7209,7 @@
           <a:p>
             <a:fld id="{6D22F896-40B5-4ADD-8801-0D06FADFA095}" type="slidenum">
               <a:rPr lang="en-US" dirty="0"/>
+              <a:pPr/>
               <a:t>‹#›</a:t>
             </a:fld>
             <a:endParaRPr lang="en-US" dirty="0"/>
@@ -7315,7 +7333,8 @@
           <a:p>
             <a:fld id="{48A87A34-81AB-432B-8DAE-1953F412C126}" type="datetimeFigureOut">
               <a:rPr lang="en-US" dirty="0"/>
-              <a:t>12/12/2017</a:t>
+              <a:pPr/>
+              <a:t>10/16/2020</a:t>
             </a:fld>
             <a:endParaRPr lang="en-US" dirty="0"/>
           </a:p>
@@ -7357,6 +7376,7 @@
           <a:p>
             <a:fld id="{6D22F896-40B5-4ADD-8801-0D06FADFA095}" type="slidenum">
               <a:rPr lang="en-US" dirty="0"/>
+              <a:pPr/>
               <a:t>‹#›</a:t>
             </a:fld>
             <a:endParaRPr lang="en-US" dirty="0"/>
@@ -7560,7 +7580,8 @@
           <a:p>
             <a:fld id="{48A87A34-81AB-432B-8DAE-1953F412C126}" type="datetimeFigureOut">
               <a:rPr lang="en-US" dirty="0"/>
-              <a:t>12/12/2017</a:t>
+              <a:pPr/>
+              <a:t>10/16/2020</a:t>
             </a:fld>
             <a:endParaRPr lang="en-US" dirty="0"/>
           </a:p>
@@ -7602,6 +7623,7 @@
           <a:p>
             <a:fld id="{6D22F896-40B5-4ADD-8801-0D06FADFA095}" type="slidenum">
               <a:rPr lang="en-US" dirty="0"/>
+              <a:pPr/>
               <a:t>‹#›</a:t>
             </a:fld>
             <a:endParaRPr lang="en-US" dirty="0"/>
@@ -7787,7 +7809,8 @@
           <a:p>
             <a:fld id="{48A87A34-81AB-432B-8DAE-1953F412C126}" type="datetimeFigureOut">
               <a:rPr lang="en-US" dirty="0"/>
-              <a:t>12/12/2017</a:t>
+              <a:pPr/>
+              <a:t>10/16/2020</a:t>
             </a:fld>
             <a:endParaRPr lang="en-US" dirty="0"/>
           </a:p>
@@ -7829,6 +7852,7 @@
           <a:p>
             <a:fld id="{6D22F896-40B5-4ADD-8801-0D06FADFA095}" type="slidenum">
               <a:rPr lang="en-US" dirty="0"/>
+              <a:pPr/>
               <a:t>‹#›</a:t>
             </a:fld>
             <a:endParaRPr lang="en-US" dirty="0"/>
@@ -8163,7 +8187,8 @@
           <a:p>
             <a:fld id="{48A87A34-81AB-432B-8DAE-1953F412C126}" type="datetimeFigureOut">
               <a:rPr lang="en-US" dirty="0"/>
-              <a:t>12/12/2017</a:t>
+              <a:pPr/>
+              <a:t>10/16/2020</a:t>
             </a:fld>
             <a:endParaRPr lang="en-US" dirty="0"/>
           </a:p>
@@ -8205,6 +8230,7 @@
           <a:p>
             <a:fld id="{6D22F896-40B5-4ADD-8801-0D06FADFA095}" type="slidenum">
               <a:rPr lang="en-US" dirty="0"/>
+              <a:pPr/>
               <a:t>‹#›</a:t>
             </a:fld>
             <a:endParaRPr lang="en-US" dirty="0"/>
@@ -8276,7 +8302,8 @@
           <a:p>
             <a:fld id="{48A87A34-81AB-432B-8DAE-1953F412C126}" type="datetimeFigureOut">
               <a:rPr lang="en-US" dirty="0"/>
-              <a:t>12/12/2017</a:t>
+              <a:pPr/>
+              <a:t>10/16/2020</a:t>
             </a:fld>
             <a:endParaRPr lang="en-US" dirty="0"/>
           </a:p>
@@ -8318,6 +8345,7 @@
           <a:p>
             <a:fld id="{6D22F896-40B5-4ADD-8801-0D06FADFA095}" type="slidenum">
               <a:rPr lang="en-US" dirty="0"/>
+              <a:pPr/>
               <a:t>‹#›</a:t>
             </a:fld>
             <a:endParaRPr lang="en-US" dirty="0"/>
@@ -8366,7 +8394,8 @@
           <a:p>
             <a:fld id="{48A87A34-81AB-432B-8DAE-1953F412C126}" type="datetimeFigureOut">
               <a:rPr lang="en-US" dirty="0"/>
-              <a:t>12/12/2017</a:t>
+              <a:pPr/>
+              <a:t>10/16/2020</a:t>
             </a:fld>
             <a:endParaRPr lang="en-US" dirty="0"/>
           </a:p>
@@ -8408,6 +8437,7 @@
           <a:p>
             <a:fld id="{6D22F896-40B5-4ADD-8801-0D06FADFA095}" type="slidenum">
               <a:rPr lang="en-US" dirty="0"/>
+              <a:pPr/>
               <a:t>‹#›</a:t>
             </a:fld>
             <a:endParaRPr lang="en-US" dirty="0"/>
@@ -8610,7 +8640,8 @@
           <a:p>
             <a:fld id="{48A87A34-81AB-432B-8DAE-1953F412C126}" type="datetimeFigureOut">
               <a:rPr lang="en-US" dirty="0"/>
-              <a:t>12/12/2017</a:t>
+              <a:pPr/>
+              <a:t>10/16/2020</a:t>
             </a:fld>
             <a:endParaRPr lang="en-US" dirty="0"/>
           </a:p>
@@ -8652,6 +8683,7 @@
           <a:p>
             <a:fld id="{6D22F896-40B5-4ADD-8801-0D06FADFA095}" type="slidenum">
               <a:rPr lang="en-US" dirty="0"/>
+              <a:pPr/>
               <a:t>‹#›</a:t>
             </a:fld>
             <a:endParaRPr lang="en-US" dirty="0"/>
@@ -8885,7 +8917,8 @@
           <a:p>
             <a:fld id="{48A87A34-81AB-432B-8DAE-1953F412C126}" type="datetimeFigureOut">
               <a:rPr lang="en-US" dirty="0"/>
-              <a:t>12/12/2017</a:t>
+              <a:pPr/>
+              <a:t>10/16/2020</a:t>
             </a:fld>
             <a:endParaRPr lang="en-US" dirty="0"/>
           </a:p>
@@ -8927,6 +8960,7 @@
           <a:p>
             <a:fld id="{6D22F896-40B5-4ADD-8801-0D06FADFA095}" type="slidenum">
               <a:rPr lang="en-US" dirty="0"/>
+              <a:pPr/>
               <a:t>‹#›</a:t>
             </a:fld>
             <a:endParaRPr lang="en-US" dirty="0"/>
@@ -8983,7 +9017,7 @@
             </a:duotone>
             <a:extLst>
               <a:ext uri="{28A0092B-C50C-407E-A947-70E740481C1C}">
-                <a14:useLocalDpi xmlns:a14="http://schemas.microsoft.com/office/drawing/2010/main" val="0"/>
+                <a14:useLocalDpi xmlns:a14="http://schemas.microsoft.com/office/drawing/2010/main" xmlns="" val="0"/>
               </a:ext>
             </a:extLst>
           </a:blip>
@@ -9003,7 +9037,7 @@
           <a:noFill/>
           <a:extLst>
             <a:ext uri="{909E8E84-426E-40dd-AFC4-6F175D3DCCD1}">
-              <a14:hiddenFill xmlns="" xmlns:a14="http://schemas.microsoft.com/office/drawing/2010/main">
+              <a14:hiddenFill xmlns:a14="http://schemas.microsoft.com/office/drawing/2010/main" xmlns="">
                 <a:solidFill>
                   <a:srgbClr val="FFFFFF"/>
                 </a:solidFill>
@@ -9077,7 +9111,7 @@
               </a:ln>
               <a:extLst>
                 <a:ext uri="{91240B29-F687-4f45-9708-019B960494DF}">
-                  <a14:hiddenLine xmlns="" xmlns:a14="http://schemas.microsoft.com/office/drawing/2010/main" w="9525">
+                  <a14:hiddenLine xmlns:a14="http://schemas.microsoft.com/office/drawing/2010/main" xmlns="" w="9525">
                     <a:solidFill>
                       <a:srgbClr val="000000"/>
                     </a:solidFill>
@@ -9167,7 +9201,7 @@
               </a:ln>
               <a:extLst>
                 <a:ext uri="{91240B29-F687-4f45-9708-019B960494DF}">
-                  <a14:hiddenLine xmlns="" xmlns:a14="http://schemas.microsoft.com/office/drawing/2010/main" w="9525">
+                  <a14:hiddenLine xmlns:a14="http://schemas.microsoft.com/office/drawing/2010/main" xmlns="" w="9525">
                     <a:solidFill>
                       <a:srgbClr val="000000"/>
                     </a:solidFill>
@@ -9257,7 +9291,7 @@
               </a:ln>
               <a:extLst>
                 <a:ext uri="{91240B29-F687-4f45-9708-019B960494DF}">
-                  <a14:hiddenLine xmlns="" xmlns:a14="http://schemas.microsoft.com/office/drawing/2010/main" w="9525">
+                  <a14:hiddenLine xmlns:a14="http://schemas.microsoft.com/office/drawing/2010/main" xmlns="" w="9525">
                     <a:solidFill>
                       <a:srgbClr val="000000"/>
                     </a:solidFill>
@@ -9319,7 +9353,7 @@
               </a:ln>
               <a:extLst>
                 <a:ext uri="{91240B29-F687-4f45-9708-019B960494DF}">
-                  <a14:hiddenLine xmlns="" xmlns:a14="http://schemas.microsoft.com/office/drawing/2010/main" w="9525">
+                  <a14:hiddenLine xmlns:a14="http://schemas.microsoft.com/office/drawing/2010/main" xmlns="" w="9525">
                     <a:solidFill>
                       <a:srgbClr val="000000"/>
                     </a:solidFill>
@@ -9409,7 +9443,7 @@
               </a:ln>
               <a:extLst>
                 <a:ext uri="{91240B29-F687-4f45-9708-019B960494DF}">
-                  <a14:hiddenLine xmlns="" xmlns:a14="http://schemas.microsoft.com/office/drawing/2010/main" w="9525">
+                  <a14:hiddenLine xmlns:a14="http://schemas.microsoft.com/office/drawing/2010/main" xmlns="" w="9525">
                     <a:solidFill>
                       <a:srgbClr val="000000"/>
                     </a:solidFill>
@@ -9471,7 +9505,7 @@
               </a:ln>
               <a:extLst>
                 <a:ext uri="{91240B29-F687-4f45-9708-019B960494DF}">
-                  <a14:hiddenLine xmlns="" xmlns:a14="http://schemas.microsoft.com/office/drawing/2010/main" w="9525">
+                  <a14:hiddenLine xmlns:a14="http://schemas.microsoft.com/office/drawing/2010/main" xmlns="" w="9525">
                     <a:solidFill>
                       <a:srgbClr val="000000"/>
                     </a:solidFill>
@@ -9533,7 +9567,7 @@
               </a:ln>
               <a:extLst>
                 <a:ext uri="{91240B29-F687-4f45-9708-019B960494DF}">
-                  <a14:hiddenLine xmlns="" xmlns:a14="http://schemas.microsoft.com/office/drawing/2010/main" w="9525">
+                  <a14:hiddenLine xmlns:a14="http://schemas.microsoft.com/office/drawing/2010/main" xmlns="" w="9525">
                     <a:solidFill>
                       <a:srgbClr val="000000"/>
                     </a:solidFill>
@@ -9623,7 +9657,7 @@
               </a:ln>
               <a:extLst>
                 <a:ext uri="{91240B29-F687-4f45-9708-019B960494DF}">
-                  <a14:hiddenLine xmlns="" xmlns:a14="http://schemas.microsoft.com/office/drawing/2010/main" w="9525">
+                  <a14:hiddenLine xmlns:a14="http://schemas.microsoft.com/office/drawing/2010/main" xmlns="" w="9525">
                     <a:solidFill>
                       <a:srgbClr val="000000"/>
                     </a:solidFill>
@@ -9713,7 +9747,7 @@
               </a:ln>
               <a:extLst>
                 <a:ext uri="{91240B29-F687-4f45-9708-019B960494DF}">
-                  <a14:hiddenLine xmlns="" xmlns:a14="http://schemas.microsoft.com/office/drawing/2010/main" w="9525">
+                  <a14:hiddenLine xmlns:a14="http://schemas.microsoft.com/office/drawing/2010/main" xmlns="" w="9525">
                     <a:solidFill>
                       <a:srgbClr val="000000"/>
                     </a:solidFill>
@@ -9775,7 +9809,7 @@
               </a:ln>
               <a:extLst>
                 <a:ext uri="{91240B29-F687-4f45-9708-019B960494DF}">
-                  <a14:hiddenLine xmlns="" xmlns:a14="http://schemas.microsoft.com/office/drawing/2010/main" w="9525">
+                  <a14:hiddenLine xmlns:a14="http://schemas.microsoft.com/office/drawing/2010/main" xmlns="" w="9525">
                     <a:solidFill>
                       <a:srgbClr val="000000"/>
                     </a:solidFill>
@@ -9885,7 +9919,7 @@
               </a:ln>
               <a:extLst>
                 <a:ext uri="{91240B29-F687-4f45-9708-019B960494DF}">
-                  <a14:hiddenLine xmlns="" xmlns:a14="http://schemas.microsoft.com/office/drawing/2010/main" w="9525">
+                  <a14:hiddenLine xmlns:a14="http://schemas.microsoft.com/office/drawing/2010/main" xmlns="" w="9525">
                     <a:solidFill>
                       <a:srgbClr val="000000"/>
                     </a:solidFill>
@@ -9969,7 +10003,7 @@
               </a:ln>
               <a:extLst>
                 <a:ext uri="{91240B29-F687-4f45-9708-019B960494DF}">
-                  <a14:hiddenLine xmlns="" xmlns:a14="http://schemas.microsoft.com/office/drawing/2010/main" w="9525">
+                  <a14:hiddenLine xmlns:a14="http://schemas.microsoft.com/office/drawing/2010/main" xmlns="" w="9525">
                     <a:solidFill>
                       <a:srgbClr val="000000"/>
                     </a:solidFill>
@@ -10031,7 +10065,7 @@
               </a:ln>
               <a:extLst>
                 <a:ext uri="{91240B29-F687-4f45-9708-019B960494DF}">
-                  <a14:hiddenLine xmlns="" xmlns:a14="http://schemas.microsoft.com/office/drawing/2010/main" w="9525">
+                  <a14:hiddenLine xmlns:a14="http://schemas.microsoft.com/office/drawing/2010/main" xmlns="" w="9525">
                     <a:solidFill>
                       <a:srgbClr val="000000"/>
                     </a:solidFill>
@@ -10093,7 +10127,7 @@
               </a:ln>
               <a:extLst>
                 <a:ext uri="{91240B29-F687-4f45-9708-019B960494DF}">
-                  <a14:hiddenLine xmlns="" xmlns:a14="http://schemas.microsoft.com/office/drawing/2010/main" w="9525">
+                  <a14:hiddenLine xmlns:a14="http://schemas.microsoft.com/office/drawing/2010/main" xmlns="" w="9525">
                     <a:solidFill>
                       <a:srgbClr val="000000"/>
                     </a:solidFill>
@@ -10183,7 +10217,7 @@
               </a:ln>
               <a:extLst>
                 <a:ext uri="{91240B29-F687-4f45-9708-019B960494DF}">
-                  <a14:hiddenLine xmlns="" xmlns:a14="http://schemas.microsoft.com/office/drawing/2010/main" w="9525">
+                  <a14:hiddenLine xmlns:a14="http://schemas.microsoft.com/office/drawing/2010/main" xmlns="" w="9525">
                     <a:solidFill>
                       <a:srgbClr val="000000"/>
                     </a:solidFill>
@@ -10217,7 +10251,7 @@
               </a:ln>
               <a:extLst>
                 <a:ext uri="{91240B29-F687-4f45-9708-019B960494DF}">
-                  <a14:hiddenLine xmlns="" xmlns:a14="http://schemas.microsoft.com/office/drawing/2010/main" w="9525">
+                  <a14:hiddenLine xmlns:a14="http://schemas.microsoft.com/office/drawing/2010/main" xmlns="" w="9525">
                     <a:solidFill>
                       <a:srgbClr val="000000"/>
                     </a:solidFill>
@@ -10282,7 +10316,7 @@
               </a:ln>
               <a:extLst>
                 <a:ext uri="{91240B29-F687-4f45-9708-019B960494DF}">
-                  <a14:hiddenLine xmlns="" xmlns:a14="http://schemas.microsoft.com/office/drawing/2010/main" w="9525">
+                  <a14:hiddenLine xmlns:a14="http://schemas.microsoft.com/office/drawing/2010/main" xmlns="" w="9525">
                     <a:solidFill>
                       <a:srgbClr val="000000"/>
                     </a:solidFill>
@@ -10372,7 +10406,7 @@
               </a:ln>
               <a:extLst>
                 <a:ext uri="{91240B29-F687-4f45-9708-019B960494DF}">
-                  <a14:hiddenLine xmlns="" xmlns:a14="http://schemas.microsoft.com/office/drawing/2010/main" w="9525">
+                  <a14:hiddenLine xmlns:a14="http://schemas.microsoft.com/office/drawing/2010/main" xmlns="" w="9525">
                     <a:solidFill>
                       <a:srgbClr val="000000"/>
                     </a:solidFill>
@@ -10434,7 +10468,7 @@
               </a:ln>
               <a:extLst>
                 <a:ext uri="{91240B29-F687-4f45-9708-019B960494DF}">
-                  <a14:hiddenLine xmlns="" xmlns:a14="http://schemas.microsoft.com/office/drawing/2010/main" w="9525">
+                  <a14:hiddenLine xmlns:a14="http://schemas.microsoft.com/office/drawing/2010/main" xmlns="" w="9525">
                     <a:solidFill>
                       <a:srgbClr val="000000"/>
                     </a:solidFill>
@@ -10524,7 +10558,7 @@
               </a:ln>
               <a:extLst>
                 <a:ext uri="{91240B29-F687-4f45-9708-019B960494DF}">
-                  <a14:hiddenLine xmlns="" xmlns:a14="http://schemas.microsoft.com/office/drawing/2010/main" w="9525">
+                  <a14:hiddenLine xmlns:a14="http://schemas.microsoft.com/office/drawing/2010/main" xmlns="" w="9525">
                     <a:solidFill>
                       <a:srgbClr val="000000"/>
                     </a:solidFill>
@@ -10589,7 +10623,7 @@
               </a:ln>
               <a:extLst>
                 <a:ext uri="{91240B29-F687-4f45-9708-019B960494DF}">
-                  <a14:hiddenLine xmlns="" xmlns:a14="http://schemas.microsoft.com/office/drawing/2010/main" w="9525">
+                  <a14:hiddenLine xmlns:a14="http://schemas.microsoft.com/office/drawing/2010/main" xmlns="" w="9525">
                     <a:solidFill>
                       <a:srgbClr val="000000"/>
                     </a:solidFill>
@@ -10651,7 +10685,7 @@
               </a:ln>
               <a:extLst>
                 <a:ext uri="{91240B29-F687-4f45-9708-019B960494DF}">
-                  <a14:hiddenLine xmlns="" xmlns:a14="http://schemas.microsoft.com/office/drawing/2010/main" w="9525">
+                  <a14:hiddenLine xmlns:a14="http://schemas.microsoft.com/office/drawing/2010/main" xmlns="" w="9525">
                     <a:solidFill>
                       <a:srgbClr val="000000"/>
                     </a:solidFill>
@@ -10741,7 +10775,7 @@
               </a:ln>
               <a:extLst>
                 <a:ext uri="{91240B29-F687-4f45-9708-019B960494DF}">
-                  <a14:hiddenLine xmlns="" xmlns:a14="http://schemas.microsoft.com/office/drawing/2010/main" w="9525">
+                  <a14:hiddenLine xmlns:a14="http://schemas.microsoft.com/office/drawing/2010/main" xmlns="" w="9525">
                     <a:solidFill>
                       <a:srgbClr val="000000"/>
                     </a:solidFill>
@@ -10831,7 +10865,7 @@
               </a:ln>
               <a:extLst>
                 <a:ext uri="{91240B29-F687-4f45-9708-019B960494DF}">
-                  <a14:hiddenLine xmlns="" xmlns:a14="http://schemas.microsoft.com/office/drawing/2010/main" w="9525">
+                  <a14:hiddenLine xmlns:a14="http://schemas.microsoft.com/office/drawing/2010/main" xmlns="" w="9525">
                     <a:solidFill>
                       <a:srgbClr val="000000"/>
                     </a:solidFill>
@@ -10896,7 +10930,7 @@
               </a:ln>
               <a:extLst>
                 <a:ext uri="{91240B29-F687-4f45-9708-019B960494DF}">
-                  <a14:hiddenLine xmlns="" xmlns:a14="http://schemas.microsoft.com/office/drawing/2010/main" w="9525">
+                  <a14:hiddenLine xmlns:a14="http://schemas.microsoft.com/office/drawing/2010/main" xmlns="" w="9525">
                     <a:solidFill>
                       <a:srgbClr val="000000"/>
                     </a:solidFill>
@@ -11016,7 +11050,7 @@
               </a:ln>
               <a:extLst>
                 <a:ext uri="{91240B29-F687-4f45-9708-019B960494DF}">
-                  <a14:hiddenLine xmlns="" xmlns:a14="http://schemas.microsoft.com/office/drawing/2010/main" w="9525">
+                  <a14:hiddenLine xmlns:a14="http://schemas.microsoft.com/office/drawing/2010/main" xmlns="" w="9525">
                     <a:solidFill>
                       <a:srgbClr val="000000"/>
                     </a:solidFill>
@@ -11097,7 +11131,7 @@
               </a:ln>
               <a:extLst>
                 <a:ext uri="{91240B29-F687-4f45-9708-019B960494DF}">
-                  <a14:hiddenLine xmlns="" xmlns:a14="http://schemas.microsoft.com/office/drawing/2010/main" w="9525">
+                  <a14:hiddenLine xmlns:a14="http://schemas.microsoft.com/office/drawing/2010/main" xmlns="" w="9525">
                     <a:solidFill>
                       <a:srgbClr val="000000"/>
                     </a:solidFill>
@@ -11212,7 +11246,7 @@
               </a:ln>
               <a:extLst>
                 <a:ext uri="{91240B29-F687-4f45-9708-019B960494DF}">
-                  <a14:hiddenLine xmlns="" xmlns:a14="http://schemas.microsoft.com/office/drawing/2010/main" w="9525">
+                  <a14:hiddenLine xmlns:a14="http://schemas.microsoft.com/office/drawing/2010/main" xmlns="" w="9525">
                     <a:solidFill>
                       <a:srgbClr val="000000"/>
                     </a:solidFill>
@@ -11302,7 +11336,7 @@
               </a:ln>
               <a:extLst>
                 <a:ext uri="{91240B29-F687-4f45-9708-019B960494DF}">
-                  <a14:hiddenLine xmlns="" xmlns:a14="http://schemas.microsoft.com/office/drawing/2010/main" w="9525">
+                  <a14:hiddenLine xmlns:a14="http://schemas.microsoft.com/office/drawing/2010/main" xmlns="" w="9525">
                     <a:solidFill>
                       <a:srgbClr val="000000"/>
                     </a:solidFill>
@@ -11367,7 +11401,7 @@
               </a:ln>
               <a:extLst>
                 <a:ext uri="{91240B29-F687-4f45-9708-019B960494DF}">
-                  <a14:hiddenLine xmlns="" xmlns:a14="http://schemas.microsoft.com/office/drawing/2010/main" w="9525">
+                  <a14:hiddenLine xmlns:a14="http://schemas.microsoft.com/office/drawing/2010/main" xmlns="" w="9525">
                     <a:solidFill>
                       <a:srgbClr val="000000"/>
                     </a:solidFill>
@@ -11457,7 +11491,7 @@
               </a:ln>
               <a:extLst>
                 <a:ext uri="{91240B29-F687-4f45-9708-019B960494DF}">
-                  <a14:hiddenLine xmlns="" xmlns:a14="http://schemas.microsoft.com/office/drawing/2010/main" w="9525">
+                  <a14:hiddenLine xmlns:a14="http://schemas.microsoft.com/office/drawing/2010/main" xmlns="" w="9525">
                     <a:solidFill>
                       <a:srgbClr val="000000"/>
                     </a:solidFill>
@@ -11525,7 +11559,7 @@
               </a:ln>
               <a:extLst>
                 <a:ext uri="{91240B29-F687-4f45-9708-019B960494DF}">
-                  <a14:hiddenLine xmlns="" xmlns:a14="http://schemas.microsoft.com/office/drawing/2010/main" w="9525">
+                  <a14:hiddenLine xmlns:a14="http://schemas.microsoft.com/office/drawing/2010/main" xmlns="" w="9525">
                     <a:solidFill>
                       <a:srgbClr val="000000"/>
                     </a:solidFill>
@@ -11615,7 +11649,7 @@
               </a:ln>
               <a:extLst>
                 <a:ext uri="{91240B29-F687-4f45-9708-019B960494DF}">
-                  <a14:hiddenLine xmlns="" xmlns:a14="http://schemas.microsoft.com/office/drawing/2010/main" w="9525">
+                  <a14:hiddenLine xmlns:a14="http://schemas.microsoft.com/office/drawing/2010/main" xmlns="" w="9525">
                     <a:solidFill>
                       <a:srgbClr val="000000"/>
                     </a:solidFill>
@@ -11683,7 +11717,7 @@
               </a:ln>
               <a:extLst>
                 <a:ext uri="{91240B29-F687-4f45-9708-019B960494DF}">
-                  <a14:hiddenLine xmlns="" xmlns:a14="http://schemas.microsoft.com/office/drawing/2010/main" w="9525">
+                  <a14:hiddenLine xmlns:a14="http://schemas.microsoft.com/office/drawing/2010/main" xmlns="" w="9525">
                     <a:solidFill>
                       <a:srgbClr val="000000"/>
                     </a:solidFill>
@@ -11773,7 +11807,7 @@
               </a:ln>
               <a:extLst>
                 <a:ext uri="{91240B29-F687-4f45-9708-019B960494DF}">
-                  <a14:hiddenLine xmlns="" xmlns:a14="http://schemas.microsoft.com/office/drawing/2010/main" w="9525">
+                  <a14:hiddenLine xmlns:a14="http://schemas.microsoft.com/office/drawing/2010/main" xmlns="" w="9525">
                     <a:solidFill>
                       <a:srgbClr val="000000"/>
                     </a:solidFill>
@@ -11807,7 +11841,7 @@
               </a:ln>
               <a:extLst>
                 <a:ext uri="{91240B29-F687-4f45-9708-019B960494DF}">
-                  <a14:hiddenLine xmlns="" xmlns:a14="http://schemas.microsoft.com/office/drawing/2010/main" w="9525">
+                  <a14:hiddenLine xmlns:a14="http://schemas.microsoft.com/office/drawing/2010/main" xmlns="" w="9525">
                     <a:solidFill>
                       <a:srgbClr val="000000"/>
                     </a:solidFill>
@@ -11948,7 +11982,7 @@
             <a:fld id="{48A87A34-81AB-432B-8DAE-1953F412C126}" type="datetimeFigureOut">
               <a:rPr lang="en-US" dirty="0"/>
               <a:pPr/>
-              <a:t>12/12/2017</a:t>
+              <a:t>10/16/2020</a:t>
             </a:fld>
             <a:endParaRPr lang="en-US" dirty="0"/>
           </a:p>
@@ -12380,7 +12414,7 @@
           <p:cNvPr id="2" name="Title 1">
             <a:extLst>
               <a:ext uri="{FF2B5EF4-FFF2-40B4-BE49-F238E27FC236}">
-                <a16:creationId xmlns:a16="http://schemas.microsoft.com/office/drawing/2014/main" id="{D45DD529-CA42-45A1-912E-B58B20A3C4F1}"/>
+                <a16:creationId xmlns:a16="http://schemas.microsoft.com/office/drawing/2014/main" xmlns="" id="{D45DD529-CA42-45A1-912E-B58B20A3C4F1}"/>
               </a:ext>
             </a:extLst>
           </p:cNvPr>
@@ -12430,7 +12464,7 @@
           <p:cNvPr id="3" name="Subtitle 2">
             <a:extLst>
               <a:ext uri="{FF2B5EF4-FFF2-40B4-BE49-F238E27FC236}">
-                <a16:creationId xmlns:a16="http://schemas.microsoft.com/office/drawing/2014/main" id="{C44C23EA-2702-482B-8B16-B896C79267D4}"/>
+                <a16:creationId xmlns:a16="http://schemas.microsoft.com/office/drawing/2014/main" xmlns="" id="{C44C23EA-2702-482B-8B16-B896C79267D4}"/>
               </a:ext>
             </a:extLst>
           </p:cNvPr>
@@ -12566,7 +12600,7 @@
           <p:cNvPr id="6" name="Picture 5">
             <a:extLst>
               <a:ext uri="{FF2B5EF4-FFF2-40B4-BE49-F238E27FC236}">
-                <a16:creationId xmlns:a16="http://schemas.microsoft.com/office/drawing/2014/main" id="{111E1FBD-DA2A-40C1-B77C-8CF7E0B06B64}"/>
+                <a16:creationId xmlns:a16="http://schemas.microsoft.com/office/drawing/2014/main" xmlns="" id="{111E1FBD-DA2A-40C1-B77C-8CF7E0B06B64}"/>
               </a:ext>
             </a:extLst>
           </p:cNvPr>
@@ -12594,7 +12628,7 @@
     </p:spTree>
     <p:extLst>
       <p:ext uri="{BB962C8B-B14F-4D97-AF65-F5344CB8AC3E}">
-        <p14:creationId xmlns:p14="http://schemas.microsoft.com/office/powerpoint/2010/main" val="312632511"/>
+        <p14:creationId xmlns:p14="http://schemas.microsoft.com/office/powerpoint/2010/main" xmlns="" val="312632511"/>
       </p:ext>
     </p:extLst>
   </p:cSld>
@@ -12637,7 +12671,7 @@
           <p:cNvPr id="2" name="Title 1">
             <a:extLst>
               <a:ext uri="{FF2B5EF4-FFF2-40B4-BE49-F238E27FC236}">
-                <a16:creationId xmlns:a16="http://schemas.microsoft.com/office/drawing/2014/main" id="{2035CCE8-E217-4D40-84B7-68A06CE43E46}"/>
+                <a16:creationId xmlns:a16="http://schemas.microsoft.com/office/drawing/2014/main" xmlns="" id="{2035CCE8-E217-4D40-84B7-68A06CE43E46}"/>
               </a:ext>
             </a:extLst>
           </p:cNvPr>
@@ -12682,7 +12716,7 @@
           <p:cNvPr id="3" name="Content Placeholder 2">
             <a:extLst>
               <a:ext uri="{FF2B5EF4-FFF2-40B4-BE49-F238E27FC236}">
-                <a16:creationId xmlns:a16="http://schemas.microsoft.com/office/drawing/2014/main" id="{270D4B3F-CCD0-4115-B766-68FD3A83DBEB}"/>
+                <a16:creationId xmlns:a16="http://schemas.microsoft.com/office/drawing/2014/main" xmlns="" id="{270D4B3F-CCD0-4115-B766-68FD3A83DBEB}"/>
               </a:ext>
             </a:extLst>
           </p:cNvPr>
@@ -13044,7 +13078,7 @@
           <p:cNvPr id="5" name="Picture 4">
             <a:extLst>
               <a:ext uri="{FF2B5EF4-FFF2-40B4-BE49-F238E27FC236}">
-                <a16:creationId xmlns:a16="http://schemas.microsoft.com/office/drawing/2014/main" id="{B9A719C8-13DC-4D58-9D70-09B4E1E7B8F5}"/>
+                <a16:creationId xmlns:a16="http://schemas.microsoft.com/office/drawing/2014/main" xmlns="" id="{B9A719C8-13DC-4D58-9D70-09B4E1E7B8F5}"/>
               </a:ext>
             </a:extLst>
           </p:cNvPr>
@@ -13072,7 +13106,7 @@
     </p:spTree>
     <p:extLst>
       <p:ext uri="{BB962C8B-B14F-4D97-AF65-F5344CB8AC3E}">
-        <p14:creationId xmlns:p14="http://schemas.microsoft.com/office/powerpoint/2010/main" val="2539988304"/>
+        <p14:creationId xmlns:p14="http://schemas.microsoft.com/office/powerpoint/2010/main" xmlns="" val="2539988304"/>
       </p:ext>
     </p:extLst>
   </p:cSld>
@@ -13115,7 +13149,7 @@
           <p:cNvPr id="2" name="Title 1">
             <a:extLst>
               <a:ext uri="{FF2B5EF4-FFF2-40B4-BE49-F238E27FC236}">
-                <a16:creationId xmlns:a16="http://schemas.microsoft.com/office/drawing/2014/main" id="{2035CCE8-E217-4D40-84B7-68A06CE43E46}"/>
+                <a16:creationId xmlns:a16="http://schemas.microsoft.com/office/drawing/2014/main" xmlns="" id="{2035CCE8-E217-4D40-84B7-68A06CE43E46}"/>
               </a:ext>
             </a:extLst>
           </p:cNvPr>
@@ -13147,7 +13181,7 @@
           <p:cNvPr id="3" name="Content Placeholder 2">
             <a:extLst>
               <a:ext uri="{FF2B5EF4-FFF2-40B4-BE49-F238E27FC236}">
-                <a16:creationId xmlns:a16="http://schemas.microsoft.com/office/drawing/2014/main" id="{270D4B3F-CCD0-4115-B766-68FD3A83DBEB}"/>
+                <a16:creationId xmlns:a16="http://schemas.microsoft.com/office/drawing/2014/main" xmlns="" id="{270D4B3F-CCD0-4115-B766-68FD3A83DBEB}"/>
               </a:ext>
             </a:extLst>
           </p:cNvPr>
@@ -13436,7 +13470,7 @@
           <p:cNvPr id="5" name="Picture 4">
             <a:extLst>
               <a:ext uri="{FF2B5EF4-FFF2-40B4-BE49-F238E27FC236}">
-                <a16:creationId xmlns:a16="http://schemas.microsoft.com/office/drawing/2014/main" id="{73552172-CE91-4997-AA9A-7125D2628FAA}"/>
+                <a16:creationId xmlns:a16="http://schemas.microsoft.com/office/drawing/2014/main" xmlns="" id="{73552172-CE91-4997-AA9A-7125D2628FAA}"/>
               </a:ext>
             </a:extLst>
           </p:cNvPr>
@@ -13464,7 +13498,7 @@
     </p:spTree>
     <p:extLst>
       <p:ext uri="{BB962C8B-B14F-4D97-AF65-F5344CB8AC3E}">
-        <p14:creationId xmlns:p14="http://schemas.microsoft.com/office/powerpoint/2010/main" val="332958061"/>
+        <p14:creationId xmlns:p14="http://schemas.microsoft.com/office/powerpoint/2010/main" xmlns="" val="332958061"/>
       </p:ext>
     </p:extLst>
   </p:cSld>
@@ -13507,7 +13541,7 @@
           <p:cNvPr id="2" name="Title 1">
             <a:extLst>
               <a:ext uri="{FF2B5EF4-FFF2-40B4-BE49-F238E27FC236}">
-                <a16:creationId xmlns:a16="http://schemas.microsoft.com/office/drawing/2014/main" id="{2035CCE8-E217-4D40-84B7-68A06CE43E46}"/>
+                <a16:creationId xmlns:a16="http://schemas.microsoft.com/office/drawing/2014/main" xmlns="" id="{2035CCE8-E217-4D40-84B7-68A06CE43E46}"/>
               </a:ext>
             </a:extLst>
           </p:cNvPr>
@@ -13555,7 +13589,7 @@
           <p:cNvPr id="3" name="Content Placeholder 2">
             <a:extLst>
               <a:ext uri="{FF2B5EF4-FFF2-40B4-BE49-F238E27FC236}">
-                <a16:creationId xmlns:a16="http://schemas.microsoft.com/office/drawing/2014/main" id="{270D4B3F-CCD0-4115-B766-68FD3A83DBEB}"/>
+                <a16:creationId xmlns:a16="http://schemas.microsoft.com/office/drawing/2014/main" xmlns="" id="{270D4B3F-CCD0-4115-B766-68FD3A83DBEB}"/>
               </a:ext>
             </a:extLst>
           </p:cNvPr>
@@ -13690,7 +13724,7 @@
           <p:cNvPr id="5" name="Picture 4">
             <a:extLst>
               <a:ext uri="{FF2B5EF4-FFF2-40B4-BE49-F238E27FC236}">
-                <a16:creationId xmlns:a16="http://schemas.microsoft.com/office/drawing/2014/main" id="{02F1A7B1-BF4A-409E-B9F9-D40E0307FC65}"/>
+                <a16:creationId xmlns:a16="http://schemas.microsoft.com/office/drawing/2014/main" xmlns="" id="{02F1A7B1-BF4A-409E-B9F9-D40E0307FC65}"/>
               </a:ext>
             </a:extLst>
           </p:cNvPr>
@@ -13718,7 +13752,7 @@
     </p:spTree>
     <p:extLst>
       <p:ext uri="{BB962C8B-B14F-4D97-AF65-F5344CB8AC3E}">
-        <p14:creationId xmlns:p14="http://schemas.microsoft.com/office/powerpoint/2010/main" val="1324614114"/>
+        <p14:creationId xmlns:p14="http://schemas.microsoft.com/office/powerpoint/2010/main" xmlns="" val="1324614114"/>
       </p:ext>
     </p:extLst>
   </p:cSld>
@@ -13761,7 +13795,7 @@
           <p:cNvPr id="2" name="Title 1">
             <a:extLst>
               <a:ext uri="{FF2B5EF4-FFF2-40B4-BE49-F238E27FC236}">
-                <a16:creationId xmlns:a16="http://schemas.microsoft.com/office/drawing/2014/main" id="{2035CCE8-E217-4D40-84B7-68A06CE43E46}"/>
+                <a16:creationId xmlns:a16="http://schemas.microsoft.com/office/drawing/2014/main" xmlns="" id="{2035CCE8-E217-4D40-84B7-68A06CE43E46}"/>
               </a:ext>
             </a:extLst>
           </p:cNvPr>
@@ -13793,7 +13827,7 @@
           <p:cNvPr id="3" name="Content Placeholder 2">
             <a:extLst>
               <a:ext uri="{FF2B5EF4-FFF2-40B4-BE49-F238E27FC236}">
-                <a16:creationId xmlns:a16="http://schemas.microsoft.com/office/drawing/2014/main" id="{270D4B3F-CCD0-4115-B766-68FD3A83DBEB}"/>
+                <a16:creationId xmlns:a16="http://schemas.microsoft.com/office/drawing/2014/main" xmlns="" id="{270D4B3F-CCD0-4115-B766-68FD3A83DBEB}"/>
               </a:ext>
             </a:extLst>
           </p:cNvPr>
@@ -13972,7 +14006,7 @@
           <p:cNvPr id="5" name="Picture 4">
             <a:extLst>
               <a:ext uri="{FF2B5EF4-FFF2-40B4-BE49-F238E27FC236}">
-                <a16:creationId xmlns:a16="http://schemas.microsoft.com/office/drawing/2014/main" id="{2F06EC64-A77F-4834-A8DB-1AB6D8BB4886}"/>
+                <a16:creationId xmlns:a16="http://schemas.microsoft.com/office/drawing/2014/main" xmlns="" id="{2F06EC64-A77F-4834-A8DB-1AB6D8BB4886}"/>
               </a:ext>
             </a:extLst>
           </p:cNvPr>
@@ -14000,7 +14034,7 @@
     </p:spTree>
     <p:extLst>
       <p:ext uri="{BB962C8B-B14F-4D97-AF65-F5344CB8AC3E}">
-        <p14:creationId xmlns:p14="http://schemas.microsoft.com/office/powerpoint/2010/main" val="2383586696"/>
+        <p14:creationId xmlns:p14="http://schemas.microsoft.com/office/powerpoint/2010/main" xmlns="" val="2383586696"/>
       </p:ext>
     </p:extLst>
   </p:cSld>
@@ -14043,7 +14077,7 @@
           <p:cNvPr id="2" name="Title 1">
             <a:extLst>
               <a:ext uri="{FF2B5EF4-FFF2-40B4-BE49-F238E27FC236}">
-                <a16:creationId xmlns:a16="http://schemas.microsoft.com/office/drawing/2014/main" id="{2035CCE8-E217-4D40-84B7-68A06CE43E46}"/>
+                <a16:creationId xmlns:a16="http://schemas.microsoft.com/office/drawing/2014/main" xmlns="" id="{2035CCE8-E217-4D40-84B7-68A06CE43E46}"/>
               </a:ext>
             </a:extLst>
           </p:cNvPr>
@@ -14075,7 +14109,7 @@
           <p:cNvPr id="3" name="Content Placeholder 2">
             <a:extLst>
               <a:ext uri="{FF2B5EF4-FFF2-40B4-BE49-F238E27FC236}">
-                <a16:creationId xmlns:a16="http://schemas.microsoft.com/office/drawing/2014/main" id="{270D4B3F-CCD0-4115-B766-68FD3A83DBEB}"/>
+                <a16:creationId xmlns:a16="http://schemas.microsoft.com/office/drawing/2014/main" xmlns="" id="{270D4B3F-CCD0-4115-B766-68FD3A83DBEB}"/>
               </a:ext>
             </a:extLst>
           </p:cNvPr>
@@ -14232,7 +14266,7 @@
           <p:cNvPr id="5" name="Picture 4">
             <a:extLst>
               <a:ext uri="{FF2B5EF4-FFF2-40B4-BE49-F238E27FC236}">
-                <a16:creationId xmlns:a16="http://schemas.microsoft.com/office/drawing/2014/main" id="{933FF465-FBEA-491E-A6FC-3362C7AF6F7E}"/>
+                <a16:creationId xmlns:a16="http://schemas.microsoft.com/office/drawing/2014/main" xmlns="" id="{933FF465-FBEA-491E-A6FC-3362C7AF6F7E}"/>
               </a:ext>
             </a:extLst>
           </p:cNvPr>
@@ -14260,7 +14294,7 @@
     </p:spTree>
     <p:extLst>
       <p:ext uri="{BB962C8B-B14F-4D97-AF65-F5344CB8AC3E}">
-        <p14:creationId xmlns:p14="http://schemas.microsoft.com/office/powerpoint/2010/main" val="530422945"/>
+        <p14:creationId xmlns:p14="http://schemas.microsoft.com/office/powerpoint/2010/main" xmlns="" val="530422945"/>
       </p:ext>
     </p:extLst>
   </p:cSld>
@@ -14303,7 +14337,7 @@
           <p:cNvPr id="2" name="Title 1">
             <a:extLst>
               <a:ext uri="{FF2B5EF4-FFF2-40B4-BE49-F238E27FC236}">
-                <a16:creationId xmlns:a16="http://schemas.microsoft.com/office/drawing/2014/main" id="{2035CCE8-E217-4D40-84B7-68A06CE43E46}"/>
+                <a16:creationId xmlns:a16="http://schemas.microsoft.com/office/drawing/2014/main" xmlns="" id="{2035CCE8-E217-4D40-84B7-68A06CE43E46}"/>
               </a:ext>
             </a:extLst>
           </p:cNvPr>
@@ -14335,7 +14369,7 @@
           <p:cNvPr id="3" name="Content Placeholder 2">
             <a:extLst>
               <a:ext uri="{FF2B5EF4-FFF2-40B4-BE49-F238E27FC236}">
-                <a16:creationId xmlns:a16="http://schemas.microsoft.com/office/drawing/2014/main" id="{270D4B3F-CCD0-4115-B766-68FD3A83DBEB}"/>
+                <a16:creationId xmlns:a16="http://schemas.microsoft.com/office/drawing/2014/main" xmlns="" id="{270D4B3F-CCD0-4115-B766-68FD3A83DBEB}"/>
               </a:ext>
             </a:extLst>
           </p:cNvPr>
@@ -14485,7 +14519,7 @@
           <p:cNvPr id="5" name="Picture 4">
             <a:extLst>
               <a:ext uri="{FF2B5EF4-FFF2-40B4-BE49-F238E27FC236}">
-                <a16:creationId xmlns:a16="http://schemas.microsoft.com/office/drawing/2014/main" id="{7FBDA45C-8633-43C8-9B94-FFE265424B47}"/>
+                <a16:creationId xmlns:a16="http://schemas.microsoft.com/office/drawing/2014/main" xmlns="" id="{7FBDA45C-8633-43C8-9B94-FFE265424B47}"/>
               </a:ext>
             </a:extLst>
           </p:cNvPr>
@@ -14513,7 +14547,7 @@
     </p:spTree>
     <p:extLst>
       <p:ext uri="{BB962C8B-B14F-4D97-AF65-F5344CB8AC3E}">
-        <p14:creationId xmlns:p14="http://schemas.microsoft.com/office/powerpoint/2010/main" val="2247715804"/>
+        <p14:creationId xmlns:p14="http://schemas.microsoft.com/office/powerpoint/2010/main" xmlns="" val="2247715804"/>
       </p:ext>
     </p:extLst>
   </p:cSld>
@@ -14556,7 +14590,7 @@
           <p:cNvPr id="2" name="Title 1">
             <a:extLst>
               <a:ext uri="{FF2B5EF4-FFF2-40B4-BE49-F238E27FC236}">
-                <a16:creationId xmlns:a16="http://schemas.microsoft.com/office/drawing/2014/main" id="{2035CCE8-E217-4D40-84B7-68A06CE43E46}"/>
+                <a16:creationId xmlns:a16="http://schemas.microsoft.com/office/drawing/2014/main" xmlns="" id="{2035CCE8-E217-4D40-84B7-68A06CE43E46}"/>
               </a:ext>
             </a:extLst>
           </p:cNvPr>
@@ -14588,7 +14622,7 @@
           <p:cNvPr id="3" name="Content Placeholder 2">
             <a:extLst>
               <a:ext uri="{FF2B5EF4-FFF2-40B4-BE49-F238E27FC236}">
-                <a16:creationId xmlns:a16="http://schemas.microsoft.com/office/drawing/2014/main" id="{270D4B3F-CCD0-4115-B766-68FD3A83DBEB}"/>
+                <a16:creationId xmlns:a16="http://schemas.microsoft.com/office/drawing/2014/main" xmlns="" id="{270D4B3F-CCD0-4115-B766-68FD3A83DBEB}"/>
               </a:ext>
             </a:extLst>
           </p:cNvPr>
@@ -14777,7 +14811,7 @@
           <p:cNvPr id="5" name="Picture 4">
             <a:extLst>
               <a:ext uri="{FF2B5EF4-FFF2-40B4-BE49-F238E27FC236}">
-                <a16:creationId xmlns:a16="http://schemas.microsoft.com/office/drawing/2014/main" id="{DF634B6D-1F79-4BB2-A078-7B29D7AB1576}"/>
+                <a16:creationId xmlns:a16="http://schemas.microsoft.com/office/drawing/2014/main" xmlns="" id="{DF634B6D-1F79-4BB2-A078-7B29D7AB1576}"/>
               </a:ext>
             </a:extLst>
           </p:cNvPr>
@@ -14805,7 +14839,7 @@
     </p:spTree>
     <p:extLst>
       <p:ext uri="{BB962C8B-B14F-4D97-AF65-F5344CB8AC3E}">
-        <p14:creationId xmlns:p14="http://schemas.microsoft.com/office/powerpoint/2010/main" val="1538542765"/>
+        <p14:creationId xmlns:p14="http://schemas.microsoft.com/office/powerpoint/2010/main" xmlns="" val="1538542765"/>
       </p:ext>
     </p:extLst>
   </p:cSld>
@@ -14848,7 +14882,7 @@
           <p:cNvPr id="2" name="Title 1">
             <a:extLst>
               <a:ext uri="{FF2B5EF4-FFF2-40B4-BE49-F238E27FC236}">
-                <a16:creationId xmlns:a16="http://schemas.microsoft.com/office/drawing/2014/main" id="{2035CCE8-E217-4D40-84B7-68A06CE43E46}"/>
+                <a16:creationId xmlns:a16="http://schemas.microsoft.com/office/drawing/2014/main" xmlns="" id="{2035CCE8-E217-4D40-84B7-68A06CE43E46}"/>
               </a:ext>
             </a:extLst>
           </p:cNvPr>
@@ -14880,7 +14914,7 @@
           <p:cNvPr id="3" name="Content Placeholder 2">
             <a:extLst>
               <a:ext uri="{FF2B5EF4-FFF2-40B4-BE49-F238E27FC236}">
-                <a16:creationId xmlns:a16="http://schemas.microsoft.com/office/drawing/2014/main" id="{270D4B3F-CCD0-4115-B766-68FD3A83DBEB}"/>
+                <a16:creationId xmlns:a16="http://schemas.microsoft.com/office/drawing/2014/main" xmlns="" id="{270D4B3F-CCD0-4115-B766-68FD3A83DBEB}"/>
               </a:ext>
             </a:extLst>
           </p:cNvPr>
@@ -14924,7 +14958,7 @@
           <p:cNvPr id="5" name="Picture 4">
             <a:extLst>
               <a:ext uri="{FF2B5EF4-FFF2-40B4-BE49-F238E27FC236}">
-                <a16:creationId xmlns:a16="http://schemas.microsoft.com/office/drawing/2014/main" id="{B542F5E3-38B5-443B-A691-2FA3E45E523E}"/>
+                <a16:creationId xmlns:a16="http://schemas.microsoft.com/office/drawing/2014/main" xmlns="" id="{B542F5E3-38B5-443B-A691-2FA3E45E523E}"/>
               </a:ext>
             </a:extLst>
           </p:cNvPr>
@@ -14952,7 +14986,7 @@
     </p:spTree>
     <p:extLst>
       <p:ext uri="{BB962C8B-B14F-4D97-AF65-F5344CB8AC3E}">
-        <p14:creationId xmlns:p14="http://schemas.microsoft.com/office/powerpoint/2010/main" val="1192835853"/>
+        <p14:creationId xmlns:p14="http://schemas.microsoft.com/office/powerpoint/2010/main" xmlns="" val="1192835853"/>
       </p:ext>
     </p:extLst>
   </p:cSld>
@@ -14995,7 +15029,7 @@
           <p:cNvPr id="2" name="Title 1">
             <a:extLst>
               <a:ext uri="{FF2B5EF4-FFF2-40B4-BE49-F238E27FC236}">
-                <a16:creationId xmlns:a16="http://schemas.microsoft.com/office/drawing/2014/main" id="{2035CCE8-E217-4D40-84B7-68A06CE43E46}"/>
+                <a16:creationId xmlns:a16="http://schemas.microsoft.com/office/drawing/2014/main" xmlns="" id="{2035CCE8-E217-4D40-84B7-68A06CE43E46}"/>
               </a:ext>
             </a:extLst>
           </p:cNvPr>
@@ -15027,7 +15061,7 @@
           <p:cNvPr id="3" name="Content Placeholder 2">
             <a:extLst>
               <a:ext uri="{FF2B5EF4-FFF2-40B4-BE49-F238E27FC236}">
-                <a16:creationId xmlns:a16="http://schemas.microsoft.com/office/drawing/2014/main" id="{270D4B3F-CCD0-4115-B766-68FD3A83DBEB}"/>
+                <a16:creationId xmlns:a16="http://schemas.microsoft.com/office/drawing/2014/main" xmlns="" id="{270D4B3F-CCD0-4115-B766-68FD3A83DBEB}"/>
               </a:ext>
             </a:extLst>
           </p:cNvPr>
@@ -15075,6 +15109,36 @@
           </a:p>
           <a:p>
             <a:r>
+              <a:rPr lang="en-US" sz="1800" dirty="0" err="1" smtClean="0">
+                <a:solidFill>
+                  <a:schemeClr val="tx2">
+                    <a:lumMod val="75000"/>
+                  </a:schemeClr>
+                </a:solidFill>
+              </a:rPr>
+              <a:t>solr</a:t>
+            </a:r>
+            <a:r>
+              <a:rPr lang="en-US" sz="1800" dirty="0" smtClean="0">
+                <a:solidFill>
+                  <a:schemeClr val="tx2">
+                    <a:lumMod val="75000"/>
+                  </a:schemeClr>
+                </a:solidFill>
+              </a:rPr>
+              <a:t> </a:t>
+            </a:r>
+            <a:r>
+              <a:rPr lang="en-US" sz="1800" dirty="0">
+                <a:solidFill>
+                  <a:schemeClr val="tx2">
+                    <a:lumMod val="75000"/>
+                  </a:schemeClr>
+                </a:solidFill>
+              </a:rPr>
+              <a:t>&amp; NSSM (to create </a:t>
+            </a:r>
+            <a:r>
               <a:rPr lang="en-US" sz="1800" dirty="0" err="1">
                 <a:solidFill>
                   <a:schemeClr val="tx2">
@@ -15082,7 +15146,27 @@
                   </a:schemeClr>
                 </a:solidFill>
               </a:rPr>
-              <a:t>Solr</a:t>
+              <a:t>s</a:t>
+            </a:r>
+            <a:r>
+              <a:rPr lang="en-US" sz="1800" dirty="0" err="1" smtClean="0">
+                <a:solidFill>
+                  <a:schemeClr val="tx2">
+                    <a:lumMod val="75000"/>
+                  </a:schemeClr>
+                </a:solidFill>
+              </a:rPr>
+              <a:t>olr</a:t>
+            </a:r>
+            <a:r>
+              <a:rPr lang="en-US" sz="1800" dirty="0" smtClean="0">
+                <a:solidFill>
+                  <a:schemeClr val="tx2">
+                    <a:lumMod val="75000"/>
+                  </a:schemeClr>
+                </a:solidFill>
+              </a:rPr>
+              <a:t> </a:t>
             </a:r>
             <a:r>
               <a:rPr lang="en-US" sz="1800" dirty="0">
@@ -15092,27 +15176,7 @@
                   </a:schemeClr>
                 </a:solidFill>
               </a:rPr>
-              <a:t> &amp; NSSM (to create </a:t>
-            </a:r>
-            <a:r>
-              <a:rPr lang="en-US" sz="1800" dirty="0" err="1">
-                <a:solidFill>
-                  <a:schemeClr val="tx2">
-                    <a:lumMod val="75000"/>
-                  </a:schemeClr>
-                </a:solidFill>
-              </a:rPr>
-              <a:t>Solr</a:t>
-            </a:r>
-            <a:r>
-              <a:rPr lang="en-US" sz="1800" dirty="0">
-                <a:solidFill>
-                  <a:schemeClr val="tx2">
-                    <a:lumMod val="75000"/>
-                  </a:schemeClr>
-                </a:solidFill>
-              </a:rPr>
-              <a:t> web service)  </a:t>
+              <a:t>web service)  </a:t>
             </a:r>
           </a:p>
           <a:p>
@@ -15182,7 +15246,7 @@
           <p:cNvPr id="5" name="Picture 4">
             <a:extLst>
               <a:ext uri="{FF2B5EF4-FFF2-40B4-BE49-F238E27FC236}">
-                <a16:creationId xmlns:a16="http://schemas.microsoft.com/office/drawing/2014/main" id="{42208C37-EB23-4C5E-8D8F-5659F95307DB}"/>
+                <a16:creationId xmlns:a16="http://schemas.microsoft.com/office/drawing/2014/main" xmlns="" id="{42208C37-EB23-4C5E-8D8F-5659F95307DB}"/>
               </a:ext>
             </a:extLst>
           </p:cNvPr>
@@ -15212,7 +15276,7 @@
           <p:cNvPr id="7" name="Picture 6">
             <a:extLst>
               <a:ext uri="{FF2B5EF4-FFF2-40B4-BE49-F238E27FC236}">
-                <a16:creationId xmlns:a16="http://schemas.microsoft.com/office/drawing/2014/main" id="{7EB6FD33-A20E-46D1-AA1E-3069E0A01FC8}"/>
+                <a16:creationId xmlns:a16="http://schemas.microsoft.com/office/drawing/2014/main" xmlns="" id="{7EB6FD33-A20E-46D1-AA1E-3069E0A01FC8}"/>
               </a:ext>
             </a:extLst>
           </p:cNvPr>
@@ -15242,7 +15306,7 @@
           <p:cNvPr id="9" name="Picture 8">
             <a:extLst>
               <a:ext uri="{FF2B5EF4-FFF2-40B4-BE49-F238E27FC236}">
-                <a16:creationId xmlns:a16="http://schemas.microsoft.com/office/drawing/2014/main" id="{C08EB98B-F3ED-4502-95E7-D80556EC463B}"/>
+                <a16:creationId xmlns:a16="http://schemas.microsoft.com/office/drawing/2014/main" xmlns="" id="{C08EB98B-F3ED-4502-95E7-D80556EC463B}"/>
               </a:ext>
             </a:extLst>
           </p:cNvPr>
@@ -15272,7 +15336,7 @@
           <p:cNvPr id="11" name="Picture 10">
             <a:extLst>
               <a:ext uri="{FF2B5EF4-FFF2-40B4-BE49-F238E27FC236}">
-                <a16:creationId xmlns:a16="http://schemas.microsoft.com/office/drawing/2014/main" id="{140AD65E-4A10-44CE-AE0E-3CF31DA3BEE0}"/>
+                <a16:creationId xmlns:a16="http://schemas.microsoft.com/office/drawing/2014/main" xmlns="" id="{140AD65E-4A10-44CE-AE0E-3CF31DA3BEE0}"/>
               </a:ext>
             </a:extLst>
           </p:cNvPr>
@@ -15302,7 +15366,7 @@
           <p:cNvPr id="13" name="Picture 12">
             <a:extLst>
               <a:ext uri="{FF2B5EF4-FFF2-40B4-BE49-F238E27FC236}">
-                <a16:creationId xmlns:a16="http://schemas.microsoft.com/office/drawing/2014/main" id="{1D5CF986-F40F-4F3C-8718-744B62F9A4B1}"/>
+                <a16:creationId xmlns:a16="http://schemas.microsoft.com/office/drawing/2014/main" xmlns="" id="{1D5CF986-F40F-4F3C-8718-744B62F9A4B1}"/>
               </a:ext>
             </a:extLst>
           </p:cNvPr>
@@ -15332,7 +15396,7 @@
           <p:cNvPr id="15" name="Picture 14">
             <a:extLst>
               <a:ext uri="{FF2B5EF4-FFF2-40B4-BE49-F238E27FC236}">
-                <a16:creationId xmlns:a16="http://schemas.microsoft.com/office/drawing/2014/main" id="{33474715-B24A-468B-8325-A3FA08774650}"/>
+                <a16:creationId xmlns:a16="http://schemas.microsoft.com/office/drawing/2014/main" xmlns="" id="{33474715-B24A-468B-8325-A3FA08774650}"/>
               </a:ext>
             </a:extLst>
           </p:cNvPr>
@@ -15362,7 +15426,7 @@
           <p:cNvPr id="17" name="Picture 16">
             <a:extLst>
               <a:ext uri="{FF2B5EF4-FFF2-40B4-BE49-F238E27FC236}">
-                <a16:creationId xmlns:a16="http://schemas.microsoft.com/office/drawing/2014/main" id="{C8A56F0D-7790-41F4-9E7E-1CE33253BDAC}"/>
+                <a16:creationId xmlns:a16="http://schemas.microsoft.com/office/drawing/2014/main" xmlns="" id="{C8A56F0D-7790-41F4-9E7E-1CE33253BDAC}"/>
               </a:ext>
             </a:extLst>
           </p:cNvPr>
@@ -15392,7 +15456,7 @@
           <p:cNvPr id="19" name="Picture 18">
             <a:extLst>
               <a:ext uri="{FF2B5EF4-FFF2-40B4-BE49-F238E27FC236}">
-                <a16:creationId xmlns:a16="http://schemas.microsoft.com/office/drawing/2014/main" id="{AD61A29C-7C57-4AEA-97D0-93D47E1134A6}"/>
+                <a16:creationId xmlns:a16="http://schemas.microsoft.com/office/drawing/2014/main" xmlns="" id="{AD61A29C-7C57-4AEA-97D0-93D47E1134A6}"/>
               </a:ext>
             </a:extLst>
           </p:cNvPr>
@@ -15420,7 +15484,7 @@
     </p:spTree>
     <p:extLst>
       <p:ext uri="{BB962C8B-B14F-4D97-AF65-F5344CB8AC3E}">
-        <p14:creationId xmlns:p14="http://schemas.microsoft.com/office/powerpoint/2010/main" val="1336992421"/>
+        <p14:creationId xmlns:p14="http://schemas.microsoft.com/office/powerpoint/2010/main" xmlns="" val="1336992421"/>
       </p:ext>
     </p:extLst>
   </p:cSld>
@@ -15463,7 +15527,7 @@
           <p:cNvPr id="2" name="Title 1">
             <a:extLst>
               <a:ext uri="{FF2B5EF4-FFF2-40B4-BE49-F238E27FC236}">
-                <a16:creationId xmlns:a16="http://schemas.microsoft.com/office/drawing/2014/main" id="{2035CCE8-E217-4D40-84B7-68A06CE43E46}"/>
+                <a16:creationId xmlns:a16="http://schemas.microsoft.com/office/drawing/2014/main" xmlns="" id="{2035CCE8-E217-4D40-84B7-68A06CE43E46}"/>
               </a:ext>
             </a:extLst>
           </p:cNvPr>
@@ -15495,7 +15559,7 @@
           <p:cNvPr id="3" name="Content Placeholder 2">
             <a:extLst>
               <a:ext uri="{FF2B5EF4-FFF2-40B4-BE49-F238E27FC236}">
-                <a16:creationId xmlns:a16="http://schemas.microsoft.com/office/drawing/2014/main" id="{270D4B3F-CCD0-4115-B766-68FD3A83DBEB}"/>
+                <a16:creationId xmlns:a16="http://schemas.microsoft.com/office/drawing/2014/main" xmlns="" id="{270D4B3F-CCD0-4115-B766-68FD3A83DBEB}"/>
               </a:ext>
             </a:extLst>
           </p:cNvPr>
@@ -15703,7 +15767,7 @@
           <p:cNvPr id="6" name="Picture 5">
             <a:extLst>
               <a:ext uri="{FF2B5EF4-FFF2-40B4-BE49-F238E27FC236}">
-                <a16:creationId xmlns:a16="http://schemas.microsoft.com/office/drawing/2014/main" id="{877208F4-A5F9-4EFB-9376-EDF64DCE4183}"/>
+                <a16:creationId xmlns:a16="http://schemas.microsoft.com/office/drawing/2014/main" xmlns="" id="{877208F4-A5F9-4EFB-9376-EDF64DCE4183}"/>
               </a:ext>
             </a:extLst>
           </p:cNvPr>
@@ -15733,7 +15797,7 @@
           <p:cNvPr id="10" name="Picture 9">
             <a:extLst>
               <a:ext uri="{FF2B5EF4-FFF2-40B4-BE49-F238E27FC236}">
-                <a16:creationId xmlns:a16="http://schemas.microsoft.com/office/drawing/2014/main" id="{4BCF1403-0A01-40A6-B444-0F5D8B62750C}"/>
+                <a16:creationId xmlns:a16="http://schemas.microsoft.com/office/drawing/2014/main" xmlns="" id="{4BCF1403-0A01-40A6-B444-0F5D8B62750C}"/>
               </a:ext>
             </a:extLst>
           </p:cNvPr>
@@ -15761,7 +15825,7 @@
     </p:spTree>
     <p:extLst>
       <p:ext uri="{BB962C8B-B14F-4D97-AF65-F5344CB8AC3E}">
-        <p14:creationId xmlns:p14="http://schemas.microsoft.com/office/powerpoint/2010/main" val="10257767"/>
+        <p14:creationId xmlns:p14="http://schemas.microsoft.com/office/powerpoint/2010/main" xmlns="" val="10257767"/>
       </p:ext>
     </p:extLst>
   </p:cSld>
@@ -15804,7 +15868,7 @@
           <p:cNvPr id="2" name="Title 1">
             <a:extLst>
               <a:ext uri="{FF2B5EF4-FFF2-40B4-BE49-F238E27FC236}">
-                <a16:creationId xmlns:a16="http://schemas.microsoft.com/office/drawing/2014/main" id="{2035CCE8-E217-4D40-84B7-68A06CE43E46}"/>
+                <a16:creationId xmlns:a16="http://schemas.microsoft.com/office/drawing/2014/main" xmlns="" id="{2035CCE8-E217-4D40-84B7-68A06CE43E46}"/>
               </a:ext>
             </a:extLst>
           </p:cNvPr>
@@ -15841,7 +15905,7 @@
           <p:cNvPr id="3" name="Content Placeholder 2">
             <a:extLst>
               <a:ext uri="{FF2B5EF4-FFF2-40B4-BE49-F238E27FC236}">
-                <a16:creationId xmlns:a16="http://schemas.microsoft.com/office/drawing/2014/main" id="{270D4B3F-CCD0-4115-B766-68FD3A83DBEB}"/>
+                <a16:creationId xmlns:a16="http://schemas.microsoft.com/office/drawing/2014/main" xmlns="" id="{270D4B3F-CCD0-4115-B766-68FD3A83DBEB}"/>
               </a:ext>
             </a:extLst>
           </p:cNvPr>
@@ -16039,7 +16103,7 @@
           <p:cNvPr id="17" name="Picture 16">
             <a:extLst>
               <a:ext uri="{FF2B5EF4-FFF2-40B4-BE49-F238E27FC236}">
-                <a16:creationId xmlns:a16="http://schemas.microsoft.com/office/drawing/2014/main" id="{9DE52EA4-5BE8-42BE-93FE-2431F4152C4E}"/>
+                <a16:creationId xmlns:a16="http://schemas.microsoft.com/office/drawing/2014/main" xmlns="" id="{9DE52EA4-5BE8-42BE-93FE-2431F4152C4E}"/>
               </a:ext>
             </a:extLst>
           </p:cNvPr>
@@ -16069,7 +16133,7 @@
           <p:cNvPr id="5" name="Picture 4">
             <a:extLst>
               <a:ext uri="{FF2B5EF4-FFF2-40B4-BE49-F238E27FC236}">
-                <a16:creationId xmlns:a16="http://schemas.microsoft.com/office/drawing/2014/main" id="{85599332-0A20-417E-AD38-EFF2EFF7394A}"/>
+                <a16:creationId xmlns:a16="http://schemas.microsoft.com/office/drawing/2014/main" xmlns="" id="{85599332-0A20-417E-AD38-EFF2EFF7394A}"/>
               </a:ext>
             </a:extLst>
           </p:cNvPr>
@@ -16099,7 +16163,7 @@
           <p:cNvPr id="4" name="Picture 3">
             <a:extLst>
               <a:ext uri="{FF2B5EF4-FFF2-40B4-BE49-F238E27FC236}">
-                <a16:creationId xmlns:a16="http://schemas.microsoft.com/office/drawing/2014/main" id="{98A4C0DB-4E9B-4A3B-B839-FFED75A6A01F}"/>
+                <a16:creationId xmlns:a16="http://schemas.microsoft.com/office/drawing/2014/main" xmlns="" id="{98A4C0DB-4E9B-4A3B-B839-FFED75A6A01F}"/>
               </a:ext>
             </a:extLst>
           </p:cNvPr>
@@ -16127,7 +16191,7 @@
     </p:spTree>
     <p:extLst>
       <p:ext uri="{BB962C8B-B14F-4D97-AF65-F5344CB8AC3E}">
-        <p14:creationId xmlns:p14="http://schemas.microsoft.com/office/powerpoint/2010/main" val="48506756"/>
+        <p14:creationId xmlns:p14="http://schemas.microsoft.com/office/powerpoint/2010/main" xmlns="" val="48506756"/>
       </p:ext>
     </p:extLst>
   </p:cSld>
@@ -16170,7 +16234,7 @@
           <p:cNvPr id="2" name="Title 1">
             <a:extLst>
               <a:ext uri="{FF2B5EF4-FFF2-40B4-BE49-F238E27FC236}">
-                <a16:creationId xmlns:a16="http://schemas.microsoft.com/office/drawing/2014/main" id="{2035CCE8-E217-4D40-84B7-68A06CE43E46}"/>
+                <a16:creationId xmlns:a16="http://schemas.microsoft.com/office/drawing/2014/main" xmlns="" id="{2035CCE8-E217-4D40-84B7-68A06CE43E46}"/>
               </a:ext>
             </a:extLst>
           </p:cNvPr>
@@ -16202,7 +16266,7 @@
           <p:cNvPr id="3" name="Content Placeholder 2">
             <a:extLst>
               <a:ext uri="{FF2B5EF4-FFF2-40B4-BE49-F238E27FC236}">
-                <a16:creationId xmlns:a16="http://schemas.microsoft.com/office/drawing/2014/main" id="{270D4B3F-CCD0-4115-B766-68FD3A83DBEB}"/>
+                <a16:creationId xmlns:a16="http://schemas.microsoft.com/office/drawing/2014/main" xmlns="" id="{270D4B3F-CCD0-4115-B766-68FD3A83DBEB}"/>
               </a:ext>
             </a:extLst>
           </p:cNvPr>
@@ -16393,7 +16457,7 @@
           <p:cNvPr id="5" name="Picture 4">
             <a:extLst>
               <a:ext uri="{FF2B5EF4-FFF2-40B4-BE49-F238E27FC236}">
-                <a16:creationId xmlns:a16="http://schemas.microsoft.com/office/drawing/2014/main" id="{AEFD3705-0F88-4AEE-8529-BF7834C5237F}"/>
+                <a16:creationId xmlns:a16="http://schemas.microsoft.com/office/drawing/2014/main" xmlns="" id="{AEFD3705-0F88-4AEE-8529-BF7834C5237F}"/>
               </a:ext>
             </a:extLst>
           </p:cNvPr>
@@ -16423,7 +16487,7 @@
           <p:cNvPr id="6" name="Picture 5">
             <a:extLst>
               <a:ext uri="{FF2B5EF4-FFF2-40B4-BE49-F238E27FC236}">
-                <a16:creationId xmlns:a16="http://schemas.microsoft.com/office/drawing/2014/main" id="{35F8B1B6-35B8-4B1E-82F9-05C6145122C0}"/>
+                <a16:creationId xmlns:a16="http://schemas.microsoft.com/office/drawing/2014/main" xmlns="" id="{35F8B1B6-35B8-4B1E-82F9-05C6145122C0}"/>
               </a:ext>
             </a:extLst>
           </p:cNvPr>
@@ -16451,7 +16515,7 @@
     </p:spTree>
     <p:extLst>
       <p:ext uri="{BB962C8B-B14F-4D97-AF65-F5344CB8AC3E}">
-        <p14:creationId xmlns:p14="http://schemas.microsoft.com/office/powerpoint/2010/main" val="3704345435"/>
+        <p14:creationId xmlns:p14="http://schemas.microsoft.com/office/powerpoint/2010/main" xmlns="" val="3704345435"/>
       </p:ext>
     </p:extLst>
   </p:cSld>
@@ -16494,7 +16558,7 @@
           <p:cNvPr id="2" name="Title 1">
             <a:extLst>
               <a:ext uri="{FF2B5EF4-FFF2-40B4-BE49-F238E27FC236}">
-                <a16:creationId xmlns:a16="http://schemas.microsoft.com/office/drawing/2014/main" id="{2035CCE8-E217-4D40-84B7-68A06CE43E46}"/>
+                <a16:creationId xmlns:a16="http://schemas.microsoft.com/office/drawing/2014/main" xmlns="" id="{2035CCE8-E217-4D40-84B7-68A06CE43E46}"/>
               </a:ext>
             </a:extLst>
           </p:cNvPr>
@@ -16531,7 +16595,7 @@
           <p:cNvPr id="3" name="Content Placeholder 2">
             <a:extLst>
               <a:ext uri="{FF2B5EF4-FFF2-40B4-BE49-F238E27FC236}">
-                <a16:creationId xmlns:a16="http://schemas.microsoft.com/office/drawing/2014/main" id="{270D4B3F-CCD0-4115-B766-68FD3A83DBEB}"/>
+                <a16:creationId xmlns:a16="http://schemas.microsoft.com/office/drawing/2014/main" xmlns="" id="{270D4B3F-CCD0-4115-B766-68FD3A83DBEB}"/>
               </a:ext>
             </a:extLst>
           </p:cNvPr>
@@ -16806,7 +16870,7 @@
           <p:cNvPr id="4" name="Picture 3">
             <a:extLst>
               <a:ext uri="{FF2B5EF4-FFF2-40B4-BE49-F238E27FC236}">
-                <a16:creationId xmlns:a16="http://schemas.microsoft.com/office/drawing/2014/main" id="{EBEBD832-033A-4BEF-BA8A-411422AA011F}"/>
+                <a16:creationId xmlns:a16="http://schemas.microsoft.com/office/drawing/2014/main" xmlns="" id="{EBEBD832-033A-4BEF-BA8A-411422AA011F}"/>
               </a:ext>
             </a:extLst>
           </p:cNvPr>
@@ -16836,7 +16900,7 @@
           <p:cNvPr id="6" name="Picture 5">
             <a:extLst>
               <a:ext uri="{FF2B5EF4-FFF2-40B4-BE49-F238E27FC236}">
-                <a16:creationId xmlns:a16="http://schemas.microsoft.com/office/drawing/2014/main" id="{A81DAFAA-0F94-4AF9-8F49-8762FAAF0421}"/>
+                <a16:creationId xmlns:a16="http://schemas.microsoft.com/office/drawing/2014/main" xmlns="" id="{A81DAFAA-0F94-4AF9-8F49-8762FAAF0421}"/>
               </a:ext>
             </a:extLst>
           </p:cNvPr>
@@ -16866,7 +16930,7 @@
           <p:cNvPr id="7" name="Picture 6">
             <a:extLst>
               <a:ext uri="{FF2B5EF4-FFF2-40B4-BE49-F238E27FC236}">
-                <a16:creationId xmlns:a16="http://schemas.microsoft.com/office/drawing/2014/main" id="{0EC8BA12-4BD5-42F6-897D-399207F0BCBC}"/>
+                <a16:creationId xmlns:a16="http://schemas.microsoft.com/office/drawing/2014/main" xmlns="" id="{0EC8BA12-4BD5-42F6-897D-399207F0BCBC}"/>
               </a:ext>
             </a:extLst>
           </p:cNvPr>
@@ -16894,7 +16958,7 @@
     </p:spTree>
     <p:extLst>
       <p:ext uri="{BB962C8B-B14F-4D97-AF65-F5344CB8AC3E}">
-        <p14:creationId xmlns:p14="http://schemas.microsoft.com/office/powerpoint/2010/main" val="3339087519"/>
+        <p14:creationId xmlns:p14="http://schemas.microsoft.com/office/powerpoint/2010/main" xmlns="" val="3339087519"/>
       </p:ext>
     </p:extLst>
   </p:cSld>
@@ -16937,7 +17001,7 @@
           <p:cNvPr id="2" name="Title 1">
             <a:extLst>
               <a:ext uri="{FF2B5EF4-FFF2-40B4-BE49-F238E27FC236}">
-                <a16:creationId xmlns:a16="http://schemas.microsoft.com/office/drawing/2014/main" id="{2035CCE8-E217-4D40-84B7-68A06CE43E46}"/>
+                <a16:creationId xmlns:a16="http://schemas.microsoft.com/office/drawing/2014/main" xmlns="" id="{2035CCE8-E217-4D40-84B7-68A06CE43E46}"/>
               </a:ext>
             </a:extLst>
           </p:cNvPr>
@@ -16974,7 +17038,7 @@
           <p:cNvPr id="3" name="Content Placeholder 2">
             <a:extLst>
               <a:ext uri="{FF2B5EF4-FFF2-40B4-BE49-F238E27FC236}">
-                <a16:creationId xmlns:a16="http://schemas.microsoft.com/office/drawing/2014/main" id="{270D4B3F-CCD0-4115-B766-68FD3A83DBEB}"/>
+                <a16:creationId xmlns:a16="http://schemas.microsoft.com/office/drawing/2014/main" xmlns="" id="{270D4B3F-CCD0-4115-B766-68FD3A83DBEB}"/>
               </a:ext>
             </a:extLst>
           </p:cNvPr>
@@ -17176,7 +17240,7 @@
           <p:cNvPr id="4" name="Picture 3">
             <a:extLst>
               <a:ext uri="{FF2B5EF4-FFF2-40B4-BE49-F238E27FC236}">
-                <a16:creationId xmlns:a16="http://schemas.microsoft.com/office/drawing/2014/main" id="{636563B5-34DC-4457-A4F7-A1A539757F2A}"/>
+                <a16:creationId xmlns:a16="http://schemas.microsoft.com/office/drawing/2014/main" xmlns="" id="{636563B5-34DC-4457-A4F7-A1A539757F2A}"/>
               </a:ext>
             </a:extLst>
           </p:cNvPr>
@@ -17206,7 +17270,7 @@
           <p:cNvPr id="6" name="Picture 5">
             <a:extLst>
               <a:ext uri="{FF2B5EF4-FFF2-40B4-BE49-F238E27FC236}">
-                <a16:creationId xmlns:a16="http://schemas.microsoft.com/office/drawing/2014/main" id="{17A9A7D6-5283-47D4-A465-BCA50FB4E3DE}"/>
+                <a16:creationId xmlns:a16="http://schemas.microsoft.com/office/drawing/2014/main" xmlns="" id="{17A9A7D6-5283-47D4-A465-BCA50FB4E3DE}"/>
               </a:ext>
             </a:extLst>
           </p:cNvPr>
@@ -17236,7 +17300,7 @@
           <p:cNvPr id="7" name="Picture 6">
             <a:extLst>
               <a:ext uri="{FF2B5EF4-FFF2-40B4-BE49-F238E27FC236}">
-                <a16:creationId xmlns:a16="http://schemas.microsoft.com/office/drawing/2014/main" id="{1002E3BF-8877-4401-A283-43D3F90A4B02}"/>
+                <a16:creationId xmlns:a16="http://schemas.microsoft.com/office/drawing/2014/main" xmlns="" id="{1002E3BF-8877-4401-A283-43D3F90A4B02}"/>
               </a:ext>
             </a:extLst>
           </p:cNvPr>
@@ -17264,7 +17328,7 @@
     </p:spTree>
     <p:extLst>
       <p:ext uri="{BB962C8B-B14F-4D97-AF65-F5344CB8AC3E}">
-        <p14:creationId xmlns:p14="http://schemas.microsoft.com/office/powerpoint/2010/main" val="35576772"/>
+        <p14:creationId xmlns:p14="http://schemas.microsoft.com/office/powerpoint/2010/main" xmlns="" val="35576772"/>
       </p:ext>
     </p:extLst>
   </p:cSld>
@@ -17307,7 +17371,7 @@
           <p:cNvPr id="2" name="Title 1">
             <a:extLst>
               <a:ext uri="{FF2B5EF4-FFF2-40B4-BE49-F238E27FC236}">
-                <a16:creationId xmlns:a16="http://schemas.microsoft.com/office/drawing/2014/main" id="{2035CCE8-E217-4D40-84B7-68A06CE43E46}"/>
+                <a16:creationId xmlns:a16="http://schemas.microsoft.com/office/drawing/2014/main" xmlns="" id="{2035CCE8-E217-4D40-84B7-68A06CE43E46}"/>
               </a:ext>
             </a:extLst>
           </p:cNvPr>
@@ -17352,7 +17416,7 @@
           <p:cNvPr id="3" name="Content Placeholder 2">
             <a:extLst>
               <a:ext uri="{FF2B5EF4-FFF2-40B4-BE49-F238E27FC236}">
-                <a16:creationId xmlns:a16="http://schemas.microsoft.com/office/drawing/2014/main" id="{270D4B3F-CCD0-4115-B766-68FD3A83DBEB}"/>
+                <a16:creationId xmlns:a16="http://schemas.microsoft.com/office/drawing/2014/main" xmlns="" id="{270D4B3F-CCD0-4115-B766-68FD3A83DBEB}"/>
               </a:ext>
             </a:extLst>
           </p:cNvPr>
@@ -17441,7 +17505,7 @@
               <a:t>Path: 		~/</a:t>
             </a:r>
             <a:r>
-              <a:rPr lang="en-US" sz="1400" dirty="0" err="1">
+              <a:rPr lang="en-US" sz="1400" dirty="0" err="1" smtClean="0">
                 <a:solidFill>
                   <a:schemeClr val="accent4">
                     <a:lumMod val="75000"/>
@@ -17451,24 +17515,14 @@
               <a:t>solr</a:t>
             </a:r>
             <a:r>
-              <a:rPr lang="en-US" sz="1400" dirty="0">
+              <a:rPr lang="en-US" sz="1400" dirty="0" smtClean="0">
                 <a:solidFill>
                   <a:schemeClr val="accent4">
                     <a:lumMod val="75000"/>
                   </a:schemeClr>
                 </a:solidFill>
               </a:rPr>
-              <a:t>/bin/</a:t>
-            </a:r>
-            <a:r>
-              <a:rPr lang="en-US" sz="1400" dirty="0" err="1">
-                <a:solidFill>
-                  <a:schemeClr val="accent4">
-                    <a:lumMod val="75000"/>
-                  </a:schemeClr>
-                </a:solidFill>
-              </a:rPr>
-              <a:t>solr.config</a:t>
+              <a:t>/bin/solr.cmd</a:t>
             </a:r>
             <a:endParaRPr lang="en-US" sz="1400" dirty="0">
               <a:solidFill>
@@ -17705,7 +17759,7 @@
           <p:cNvPr id="5" name="Picture 4">
             <a:extLst>
               <a:ext uri="{FF2B5EF4-FFF2-40B4-BE49-F238E27FC236}">
-                <a16:creationId xmlns:a16="http://schemas.microsoft.com/office/drawing/2014/main" id="{830AB264-0996-44E0-A0F1-6A8D111A2022}"/>
+                <a16:creationId xmlns:a16="http://schemas.microsoft.com/office/drawing/2014/main" xmlns="" id="{830AB264-0996-44E0-A0F1-6A8D111A2022}"/>
               </a:ext>
             </a:extLst>
           </p:cNvPr>
@@ -17733,7 +17787,7 @@
     </p:spTree>
     <p:extLst>
       <p:ext uri="{BB962C8B-B14F-4D97-AF65-F5344CB8AC3E}">
-        <p14:creationId xmlns:p14="http://schemas.microsoft.com/office/powerpoint/2010/main" val="802156209"/>
+        <p14:creationId xmlns:p14="http://schemas.microsoft.com/office/powerpoint/2010/main" xmlns="" val="802156209"/>
       </p:ext>
     </p:extLst>
   </p:cSld>
@@ -17776,7 +17830,7 @@
           <p:cNvPr id="2" name="Title 1">
             <a:extLst>
               <a:ext uri="{FF2B5EF4-FFF2-40B4-BE49-F238E27FC236}">
-                <a16:creationId xmlns:a16="http://schemas.microsoft.com/office/drawing/2014/main" id="{2035CCE8-E217-4D40-84B7-68A06CE43E46}"/>
+                <a16:creationId xmlns:a16="http://schemas.microsoft.com/office/drawing/2014/main" xmlns="" id="{2035CCE8-E217-4D40-84B7-68A06CE43E46}"/>
               </a:ext>
             </a:extLst>
           </p:cNvPr>
@@ -17816,7 +17870,7 @@
           <p:cNvPr id="3" name="Content Placeholder 2">
             <a:extLst>
               <a:ext uri="{FF2B5EF4-FFF2-40B4-BE49-F238E27FC236}">
-                <a16:creationId xmlns:a16="http://schemas.microsoft.com/office/drawing/2014/main" id="{270D4B3F-CCD0-4115-B766-68FD3A83DBEB}"/>
+                <a16:creationId xmlns:a16="http://schemas.microsoft.com/office/drawing/2014/main" xmlns="" id="{270D4B3F-CCD0-4115-B766-68FD3A83DBEB}"/>
               </a:ext>
             </a:extLst>
           </p:cNvPr>
@@ -18157,7 +18211,7 @@
           <p:cNvPr id="5" name="Picture 4">
             <a:extLst>
               <a:ext uri="{FF2B5EF4-FFF2-40B4-BE49-F238E27FC236}">
-                <a16:creationId xmlns:a16="http://schemas.microsoft.com/office/drawing/2014/main" id="{2708B95F-EC01-42A3-A878-E10C4DC46FA3}"/>
+                <a16:creationId xmlns:a16="http://schemas.microsoft.com/office/drawing/2014/main" xmlns="" id="{2708B95F-EC01-42A3-A878-E10C4DC46FA3}"/>
               </a:ext>
             </a:extLst>
           </p:cNvPr>
@@ -18185,7 +18239,7 @@
     </p:spTree>
     <p:extLst>
       <p:ext uri="{BB962C8B-B14F-4D97-AF65-F5344CB8AC3E}">
-        <p14:creationId xmlns:p14="http://schemas.microsoft.com/office/powerpoint/2010/main" val="3060713126"/>
+        <p14:creationId xmlns:p14="http://schemas.microsoft.com/office/powerpoint/2010/main" xmlns="" val="3060713126"/>
       </p:ext>
     </p:extLst>
   </p:cSld>
@@ -18238,7 +18292,7 @@
     </a:clrScheme>
     <a:fontScheme name="Circuit">
       <a:majorFont>
-        <a:latin typeface="Tw Cen MT" panose="020B0602020104020603"/>
+        <a:latin typeface="Tw Cen MT"/>
         <a:ea typeface=""/>
         <a:cs typeface=""/>
         <a:font script="Jpan" typeface="ＭＳ Ｐゴシック"/>
@@ -18273,7 +18327,7 @@
         <a:font script="Geor" typeface="Sylfaen"/>
       </a:majorFont>
       <a:minorFont>
-        <a:latin typeface="Tw Cen MT" panose="020B0602020104020603"/>
+        <a:latin typeface="Tw Cen MT"/>
         <a:ea typeface=""/>
         <a:cs typeface=""/>
         <a:font script="Jpan" typeface="ＭＳ Ｐゴシック"/>
@@ -18440,7 +18494,7 @@
   <a:extraClrSchemeLst/>
   <a:extLst>
     <a:ext uri="{05A4C25C-085E-4340-85A3-A5531E510DB2}">
-      <thm15:themeFamily xmlns:thm15="http://schemas.microsoft.com/office/thememl/2012/main" name="Circuit" id="{0AC2F7E7-15F5-431C-B2A2-456FE929F56C}" vid="{14971C58-AB76-4A2A-B231-5F8CA03CF491}"/>
+      <thm15:themeFamily xmlns:thm15="http://schemas.microsoft.com/office/thememl/2012/main" xmlns="" name="Circuit" id="{0AC2F7E7-15F5-431C-B2A2-456FE929F56C}" vid="{14971C58-AB76-4A2A-B231-5F8CA03CF491}"/>
     </a:ext>
   </a:extLst>
 </a:theme>

</xml_diff>